<commit_message>
lots of comments and stopwords work
</commit_message>
<xml_diff>
--- a/presentation.pptx
+++ b/presentation.pptx
@@ -104,6 +104,11 @@
       </a:defRPr>
     </a:lvl9pPr>
   </p:defaultTextStyle>
+  <p:extLst>
+    <p:ext uri="{EFAFB233-063F-42B5-8137-9DF3F51BA10A}">
+      <p15:sldGuideLst xmlns:p15="http://schemas.microsoft.com/office/powerpoint/2012/main"/>
+    </p:ext>
+  </p:extLst>
 </p:presentation>
 </file>
 
@@ -254,7 +259,7 @@
           <a:p>
             <a:fld id="{B53C49C8-4B05-EE40-8396-8AD4B7C5BFD8}" type="datetimeFigureOut">
               <a:rPr lang="en-US" smtClean="0"/>
-              <a:t>9/7/23</a:t>
+              <a:t>10/3/23</a:t>
             </a:fld>
             <a:endParaRPr lang="en-US"/>
           </a:p>
@@ -452,7 +457,7 @@
           <a:p>
             <a:fld id="{B53C49C8-4B05-EE40-8396-8AD4B7C5BFD8}" type="datetimeFigureOut">
               <a:rPr lang="en-US" smtClean="0"/>
-              <a:t>9/7/23</a:t>
+              <a:t>10/3/23</a:t>
             </a:fld>
             <a:endParaRPr lang="en-US"/>
           </a:p>
@@ -660,7 +665,7 @@
           <a:p>
             <a:fld id="{B53C49C8-4B05-EE40-8396-8AD4B7C5BFD8}" type="datetimeFigureOut">
               <a:rPr lang="en-US" smtClean="0"/>
-              <a:t>9/7/23</a:t>
+              <a:t>10/3/23</a:t>
             </a:fld>
             <a:endParaRPr lang="en-US"/>
           </a:p>
@@ -858,7 +863,7 @@
           <a:p>
             <a:fld id="{B53C49C8-4B05-EE40-8396-8AD4B7C5BFD8}" type="datetimeFigureOut">
               <a:rPr lang="en-US" smtClean="0"/>
-              <a:t>9/7/23</a:t>
+              <a:t>10/3/23</a:t>
             </a:fld>
             <a:endParaRPr lang="en-US"/>
           </a:p>
@@ -1133,7 +1138,7 @@
           <a:p>
             <a:fld id="{B53C49C8-4B05-EE40-8396-8AD4B7C5BFD8}" type="datetimeFigureOut">
               <a:rPr lang="en-US" smtClean="0"/>
-              <a:t>9/7/23</a:t>
+              <a:t>10/3/23</a:t>
             </a:fld>
             <a:endParaRPr lang="en-US"/>
           </a:p>
@@ -1398,7 +1403,7 @@
           <a:p>
             <a:fld id="{B53C49C8-4B05-EE40-8396-8AD4B7C5BFD8}" type="datetimeFigureOut">
               <a:rPr lang="en-US" smtClean="0"/>
-              <a:t>9/7/23</a:t>
+              <a:t>10/3/23</a:t>
             </a:fld>
             <a:endParaRPr lang="en-US"/>
           </a:p>
@@ -1810,7 +1815,7 @@
           <a:p>
             <a:fld id="{B53C49C8-4B05-EE40-8396-8AD4B7C5BFD8}" type="datetimeFigureOut">
               <a:rPr lang="en-US" smtClean="0"/>
-              <a:t>9/7/23</a:t>
+              <a:t>10/3/23</a:t>
             </a:fld>
             <a:endParaRPr lang="en-US"/>
           </a:p>
@@ -1951,7 +1956,7 @@
           <a:p>
             <a:fld id="{B53C49C8-4B05-EE40-8396-8AD4B7C5BFD8}" type="datetimeFigureOut">
               <a:rPr lang="en-US" smtClean="0"/>
-              <a:t>9/7/23</a:t>
+              <a:t>10/3/23</a:t>
             </a:fld>
             <a:endParaRPr lang="en-US"/>
           </a:p>
@@ -2064,7 +2069,7 @@
           <a:p>
             <a:fld id="{B53C49C8-4B05-EE40-8396-8AD4B7C5BFD8}" type="datetimeFigureOut">
               <a:rPr lang="en-US" smtClean="0"/>
-              <a:t>9/7/23</a:t>
+              <a:t>10/3/23</a:t>
             </a:fld>
             <a:endParaRPr lang="en-US"/>
           </a:p>
@@ -2375,7 +2380,7 @@
           <a:p>
             <a:fld id="{B53C49C8-4B05-EE40-8396-8AD4B7C5BFD8}" type="datetimeFigureOut">
               <a:rPr lang="en-US" smtClean="0"/>
-              <a:t>9/7/23</a:t>
+              <a:t>10/3/23</a:t>
             </a:fld>
             <a:endParaRPr lang="en-US"/>
           </a:p>
@@ -2663,7 +2668,7 @@
           <a:p>
             <a:fld id="{B53C49C8-4B05-EE40-8396-8AD4B7C5BFD8}" type="datetimeFigureOut">
               <a:rPr lang="en-US" smtClean="0"/>
-              <a:t>9/7/23</a:t>
+              <a:t>10/3/23</a:t>
             </a:fld>
             <a:endParaRPr lang="en-US"/>
           </a:p>
@@ -2904,7 +2909,7 @@
           <a:p>
             <a:fld id="{B53C49C8-4B05-EE40-8396-8AD4B7C5BFD8}" type="datetimeFigureOut">
               <a:rPr lang="en-US" smtClean="0"/>
-              <a:t>9/7/23</a:t>
+              <a:t>10/3/23</a:t>
             </a:fld>
             <a:endParaRPr lang="en-US"/>
           </a:p>
@@ -3342,7 +3347,18 @@
           <a:bodyPr/>
           <a:lstStyle/>
           <a:p>
-            <a:endParaRPr lang="en-US"/>
+            <a:r>
+              <a:rPr lang="en-US" dirty="0"/>
+              <a:t>goals, data</a:t>
+            </a:r>
+            <a:r>
+              <a:rPr lang="en-US"/>
+              <a:t>, methods, </a:t>
+            </a:r>
+            <a:r>
+              <a:rPr lang="en-US" dirty="0"/>
+              <a:t>results</a:t>
+            </a:r>
           </a:p>
         </p:txBody>
       </p:sp>

</xml_diff>

<commit_message>
final commit before project review
</commit_message>
<xml_diff>
--- a/presentation.pptx
+++ b/presentation.pptx
@@ -269,7 +269,7 @@
           <a:p>
             <a:fld id="{B53C49C8-4B05-EE40-8396-8AD4B7C5BFD8}" type="datetimeFigureOut">
               <a:rPr lang="en-US" smtClean="0"/>
-              <a:t>10/10/23</a:t>
+              <a:t>10/11/23</a:t>
             </a:fld>
             <a:endParaRPr lang="en-US"/>
           </a:p>
@@ -467,7 +467,7 @@
           <a:p>
             <a:fld id="{B53C49C8-4B05-EE40-8396-8AD4B7C5BFD8}" type="datetimeFigureOut">
               <a:rPr lang="en-US" smtClean="0"/>
-              <a:t>10/10/23</a:t>
+              <a:t>10/11/23</a:t>
             </a:fld>
             <a:endParaRPr lang="en-US"/>
           </a:p>
@@ -675,7 +675,7 @@
           <a:p>
             <a:fld id="{B53C49C8-4B05-EE40-8396-8AD4B7C5BFD8}" type="datetimeFigureOut">
               <a:rPr lang="en-US" smtClean="0"/>
-              <a:t>10/10/23</a:t>
+              <a:t>10/11/23</a:t>
             </a:fld>
             <a:endParaRPr lang="en-US"/>
           </a:p>
@@ -873,7 +873,7 @@
           <a:p>
             <a:fld id="{B53C49C8-4B05-EE40-8396-8AD4B7C5BFD8}" type="datetimeFigureOut">
               <a:rPr lang="en-US" smtClean="0"/>
-              <a:t>10/10/23</a:t>
+              <a:t>10/11/23</a:t>
             </a:fld>
             <a:endParaRPr lang="en-US"/>
           </a:p>
@@ -1148,7 +1148,7 @@
           <a:p>
             <a:fld id="{B53C49C8-4B05-EE40-8396-8AD4B7C5BFD8}" type="datetimeFigureOut">
               <a:rPr lang="en-US" smtClean="0"/>
-              <a:t>10/10/23</a:t>
+              <a:t>10/11/23</a:t>
             </a:fld>
             <a:endParaRPr lang="en-US"/>
           </a:p>
@@ -1413,7 +1413,7 @@
           <a:p>
             <a:fld id="{B53C49C8-4B05-EE40-8396-8AD4B7C5BFD8}" type="datetimeFigureOut">
               <a:rPr lang="en-US" smtClean="0"/>
-              <a:t>10/10/23</a:t>
+              <a:t>10/11/23</a:t>
             </a:fld>
             <a:endParaRPr lang="en-US"/>
           </a:p>
@@ -1825,7 +1825,7 @@
           <a:p>
             <a:fld id="{B53C49C8-4B05-EE40-8396-8AD4B7C5BFD8}" type="datetimeFigureOut">
               <a:rPr lang="en-US" smtClean="0"/>
-              <a:t>10/10/23</a:t>
+              <a:t>10/11/23</a:t>
             </a:fld>
             <a:endParaRPr lang="en-US"/>
           </a:p>
@@ -1966,7 +1966,7 @@
           <a:p>
             <a:fld id="{B53C49C8-4B05-EE40-8396-8AD4B7C5BFD8}" type="datetimeFigureOut">
               <a:rPr lang="en-US" smtClean="0"/>
-              <a:t>10/10/23</a:t>
+              <a:t>10/11/23</a:t>
             </a:fld>
             <a:endParaRPr lang="en-US"/>
           </a:p>
@@ -2079,7 +2079,7 @@
           <a:p>
             <a:fld id="{B53C49C8-4B05-EE40-8396-8AD4B7C5BFD8}" type="datetimeFigureOut">
               <a:rPr lang="en-US" smtClean="0"/>
-              <a:t>10/10/23</a:t>
+              <a:t>10/11/23</a:t>
             </a:fld>
             <a:endParaRPr lang="en-US"/>
           </a:p>
@@ -2390,7 +2390,7 @@
           <a:p>
             <a:fld id="{B53C49C8-4B05-EE40-8396-8AD4B7C5BFD8}" type="datetimeFigureOut">
               <a:rPr lang="en-US" smtClean="0"/>
-              <a:t>10/10/23</a:t>
+              <a:t>10/11/23</a:t>
             </a:fld>
             <a:endParaRPr lang="en-US"/>
           </a:p>
@@ -2678,7 +2678,7 @@
           <a:p>
             <a:fld id="{B53C49C8-4B05-EE40-8396-8AD4B7C5BFD8}" type="datetimeFigureOut">
               <a:rPr lang="en-US" smtClean="0"/>
-              <a:t>10/10/23</a:t>
+              <a:t>10/11/23</a:t>
             </a:fld>
             <a:endParaRPr lang="en-US"/>
           </a:p>
@@ -2925,7 +2925,7 @@
           <a:p>
             <a:fld id="{B53C49C8-4B05-EE40-8396-8AD4B7C5BFD8}" type="datetimeFigureOut">
               <a:rPr lang="en-US" smtClean="0"/>
-              <a:t>10/10/23</a:t>
+              <a:t>10/11/23</a:t>
             </a:fld>
             <a:endParaRPr lang="en-US"/>
           </a:p>
@@ -3614,6 +3614,129 @@
           </a:p>
         </p:txBody>
       </p:sp>
+      <p:sp>
+        <p:nvSpPr>
+          <p:cNvPr id="3" name="TextBox 2">
+            <a:extLst>
+              <a:ext uri="{FF2B5EF4-FFF2-40B4-BE49-F238E27FC236}">
+                <a16:creationId xmlns:a16="http://schemas.microsoft.com/office/drawing/2014/main" id="{2306E396-E512-0477-F0EF-0F53CBBA6C05}"/>
+              </a:ext>
+            </a:extLst>
+          </p:cNvPr>
+          <p:cNvSpPr txBox="1"/>
+          <p:nvPr/>
+        </p:nvSpPr>
+        <p:spPr>
+          <a:xfrm>
+            <a:off x="838200" y="1690688"/>
+            <a:ext cx="9251950" cy="584775"/>
+          </a:xfrm>
+          <a:prstGeom prst="rect">
+            <a:avLst/>
+          </a:prstGeom>
+          <a:noFill/>
+        </p:spPr>
+        <p:txBody>
+          <a:bodyPr wrap="square" rtlCol="0">
+            <a:spAutoFit/>
+          </a:bodyPr>
+          <a:lstStyle/>
+          <a:p>
+            <a:pPr marL="457200" indent="-457200">
+              <a:buFont typeface="Arial" panose="020B0604020202020204" pitchFamily="34" charset="0"/>
+              <a:buChar char="•"/>
+            </a:pPr>
+            <a:r>
+              <a:rPr lang="en-US" sz="3200" dirty="0">
+                <a:latin typeface="Garamond" panose="02020404030301010803" pitchFamily="18" charset="0"/>
+              </a:rPr>
+              <a:t>analyze all three sentiments</a:t>
+            </a:r>
+          </a:p>
+        </p:txBody>
+      </p:sp>
+      <p:sp>
+        <p:nvSpPr>
+          <p:cNvPr id="5" name="TextBox 4">
+            <a:extLst>
+              <a:ext uri="{FF2B5EF4-FFF2-40B4-BE49-F238E27FC236}">
+                <a16:creationId xmlns:a16="http://schemas.microsoft.com/office/drawing/2014/main" id="{C4000F46-69B5-EDDA-78D7-43BB9CD8000D}"/>
+              </a:ext>
+            </a:extLst>
+          </p:cNvPr>
+          <p:cNvSpPr txBox="1"/>
+          <p:nvPr/>
+        </p:nvSpPr>
+        <p:spPr>
+          <a:xfrm>
+            <a:off x="838200" y="3016251"/>
+            <a:ext cx="9251950" cy="1077218"/>
+          </a:xfrm>
+          <a:prstGeom prst="rect">
+            <a:avLst/>
+          </a:prstGeom>
+          <a:noFill/>
+        </p:spPr>
+        <p:txBody>
+          <a:bodyPr wrap="square" rtlCol="0">
+            <a:spAutoFit/>
+          </a:bodyPr>
+          <a:lstStyle/>
+          <a:p>
+            <a:pPr marL="457200" indent="-457200">
+              <a:buFont typeface="Arial" panose="020B0604020202020204" pitchFamily="34" charset="0"/>
+              <a:buChar char="•"/>
+            </a:pPr>
+            <a:r>
+              <a:rPr lang="en-US" sz="3200" dirty="0">
+                <a:latin typeface="Garamond" panose="02020404030301010803" pitchFamily="18" charset="0"/>
+              </a:rPr>
+              <a:t>incorporate more features to the model (e.g. tweet length)</a:t>
+            </a:r>
+          </a:p>
+        </p:txBody>
+      </p:sp>
+      <p:sp>
+        <p:nvSpPr>
+          <p:cNvPr id="6" name="TextBox 5">
+            <a:extLst>
+              <a:ext uri="{FF2B5EF4-FFF2-40B4-BE49-F238E27FC236}">
+                <a16:creationId xmlns:a16="http://schemas.microsoft.com/office/drawing/2014/main" id="{CB9AB30D-0FDB-AF3A-7242-1534C80F2FD3}"/>
+              </a:ext>
+            </a:extLst>
+          </p:cNvPr>
+          <p:cNvSpPr txBox="1"/>
+          <p:nvPr/>
+        </p:nvSpPr>
+        <p:spPr>
+          <a:xfrm>
+            <a:off x="838200" y="4834257"/>
+            <a:ext cx="9251950" cy="584775"/>
+          </a:xfrm>
+          <a:prstGeom prst="rect">
+            <a:avLst/>
+          </a:prstGeom>
+          <a:noFill/>
+        </p:spPr>
+        <p:txBody>
+          <a:bodyPr wrap="square" rtlCol="0">
+            <a:spAutoFit/>
+          </a:bodyPr>
+          <a:lstStyle/>
+          <a:p>
+            <a:pPr marL="457200" indent="-457200">
+              <a:buFont typeface="Arial" panose="020B0604020202020204" pitchFamily="34" charset="0"/>
+              <a:buChar char="•"/>
+            </a:pPr>
+            <a:r>
+              <a:rPr lang="en-US" sz="3200" dirty="0">
+                <a:latin typeface="Garamond" panose="02020404030301010803" pitchFamily="18" charset="0"/>
+              </a:rPr>
+              <a:t>get to the bottom of overfitting issues</a:t>
+            </a:r>
+          </a:p>
+        </p:txBody>
+      </p:sp>
     </p:spTree>
     <p:extLst>
       <p:ext uri="{BB962C8B-B14F-4D97-AF65-F5344CB8AC3E}">
@@ -3624,6 +3747,219 @@
   <p:clrMapOvr>
     <a:masterClrMapping/>
   </p:clrMapOvr>
+  <p:timing>
+    <p:tnLst>
+      <p:par>
+        <p:cTn id="1" dur="indefinite" restart="never" nodeType="tmRoot">
+          <p:childTnLst>
+            <p:seq concurrent="1" nextAc="seek">
+              <p:cTn id="2" dur="indefinite" nodeType="mainSeq">
+                <p:childTnLst>
+                  <p:par>
+                    <p:cTn id="3" fill="hold">
+                      <p:stCondLst>
+                        <p:cond delay="indefinite"/>
+                      </p:stCondLst>
+                      <p:childTnLst>
+                        <p:par>
+                          <p:cTn id="4" fill="hold">
+                            <p:stCondLst>
+                              <p:cond delay="0"/>
+                            </p:stCondLst>
+                            <p:childTnLst>
+                              <p:par>
+                                <p:cTn id="5" presetID="9" presetClass="entr" presetSubtype="0" fill="hold" nodeType="clickEffect">
+                                  <p:stCondLst>
+                                    <p:cond delay="0"/>
+                                  </p:stCondLst>
+                                  <p:childTnLst>
+                                    <p:set>
+                                      <p:cBhvr>
+                                        <p:cTn id="6" dur="1" fill="hold">
+                                          <p:stCondLst>
+                                            <p:cond delay="0"/>
+                                          </p:stCondLst>
+                                        </p:cTn>
+                                        <p:tgtEl>
+                                          <p:spTgt spid="3">
+                                            <p:txEl>
+                                              <p:pRg st="0" end="0"/>
+                                            </p:txEl>
+                                          </p:spTgt>
+                                        </p:tgtEl>
+                                        <p:attrNameLst>
+                                          <p:attrName>style.visibility</p:attrName>
+                                        </p:attrNameLst>
+                                      </p:cBhvr>
+                                      <p:to>
+                                        <p:strVal val="visible"/>
+                                      </p:to>
+                                    </p:set>
+                                    <p:animEffect transition="in" filter="dissolve">
+                                      <p:cBhvr>
+                                        <p:cTn id="7" dur="500"/>
+                                        <p:tgtEl>
+                                          <p:spTgt spid="3">
+                                            <p:txEl>
+                                              <p:pRg st="0" end="0"/>
+                                            </p:txEl>
+                                          </p:spTgt>
+                                        </p:tgtEl>
+                                      </p:cBhvr>
+                                    </p:animEffect>
+                                  </p:childTnLst>
+                                </p:cTn>
+                              </p:par>
+                            </p:childTnLst>
+                          </p:cTn>
+                        </p:par>
+                      </p:childTnLst>
+                    </p:cTn>
+                  </p:par>
+                  <p:par>
+                    <p:cTn id="8" fill="hold">
+                      <p:stCondLst>
+                        <p:cond delay="indefinite"/>
+                      </p:stCondLst>
+                      <p:childTnLst>
+                        <p:par>
+                          <p:cTn id="9" fill="hold">
+                            <p:stCondLst>
+                              <p:cond delay="0"/>
+                            </p:stCondLst>
+                            <p:childTnLst>
+                              <p:par>
+                                <p:cTn id="10" presetID="9" presetClass="entr" presetSubtype="0" fill="hold" nodeType="clickEffect">
+                                  <p:stCondLst>
+                                    <p:cond delay="0"/>
+                                  </p:stCondLst>
+                                  <p:childTnLst>
+                                    <p:set>
+                                      <p:cBhvr>
+                                        <p:cTn id="11" dur="1" fill="hold">
+                                          <p:stCondLst>
+                                            <p:cond delay="0"/>
+                                          </p:stCondLst>
+                                        </p:cTn>
+                                        <p:tgtEl>
+                                          <p:spTgt spid="5">
+                                            <p:txEl>
+                                              <p:pRg st="0" end="0"/>
+                                            </p:txEl>
+                                          </p:spTgt>
+                                        </p:tgtEl>
+                                        <p:attrNameLst>
+                                          <p:attrName>style.visibility</p:attrName>
+                                        </p:attrNameLst>
+                                      </p:cBhvr>
+                                      <p:to>
+                                        <p:strVal val="visible"/>
+                                      </p:to>
+                                    </p:set>
+                                    <p:animEffect transition="in" filter="dissolve">
+                                      <p:cBhvr>
+                                        <p:cTn id="12" dur="500"/>
+                                        <p:tgtEl>
+                                          <p:spTgt spid="5">
+                                            <p:txEl>
+                                              <p:pRg st="0" end="0"/>
+                                            </p:txEl>
+                                          </p:spTgt>
+                                        </p:tgtEl>
+                                      </p:cBhvr>
+                                    </p:animEffect>
+                                  </p:childTnLst>
+                                </p:cTn>
+                              </p:par>
+                            </p:childTnLst>
+                          </p:cTn>
+                        </p:par>
+                      </p:childTnLst>
+                    </p:cTn>
+                  </p:par>
+                  <p:par>
+                    <p:cTn id="13" fill="hold">
+                      <p:stCondLst>
+                        <p:cond delay="indefinite"/>
+                      </p:stCondLst>
+                      <p:childTnLst>
+                        <p:par>
+                          <p:cTn id="14" fill="hold">
+                            <p:stCondLst>
+                              <p:cond delay="0"/>
+                            </p:stCondLst>
+                            <p:childTnLst>
+                              <p:par>
+                                <p:cTn id="15" presetID="9" presetClass="entr" presetSubtype="0" fill="hold" nodeType="clickEffect">
+                                  <p:stCondLst>
+                                    <p:cond delay="0"/>
+                                  </p:stCondLst>
+                                  <p:childTnLst>
+                                    <p:set>
+                                      <p:cBhvr>
+                                        <p:cTn id="16" dur="1" fill="hold">
+                                          <p:stCondLst>
+                                            <p:cond delay="0"/>
+                                          </p:stCondLst>
+                                        </p:cTn>
+                                        <p:tgtEl>
+                                          <p:spTgt spid="6">
+                                            <p:txEl>
+                                              <p:pRg st="0" end="0"/>
+                                            </p:txEl>
+                                          </p:spTgt>
+                                        </p:tgtEl>
+                                        <p:attrNameLst>
+                                          <p:attrName>style.visibility</p:attrName>
+                                        </p:attrNameLst>
+                                      </p:cBhvr>
+                                      <p:to>
+                                        <p:strVal val="visible"/>
+                                      </p:to>
+                                    </p:set>
+                                    <p:animEffect transition="in" filter="dissolve">
+                                      <p:cBhvr>
+                                        <p:cTn id="17" dur="500"/>
+                                        <p:tgtEl>
+                                          <p:spTgt spid="6">
+                                            <p:txEl>
+                                              <p:pRg st="0" end="0"/>
+                                            </p:txEl>
+                                          </p:spTgt>
+                                        </p:tgtEl>
+                                      </p:cBhvr>
+                                    </p:animEffect>
+                                  </p:childTnLst>
+                                </p:cTn>
+                              </p:par>
+                            </p:childTnLst>
+                          </p:cTn>
+                        </p:par>
+                      </p:childTnLst>
+                    </p:cTn>
+                  </p:par>
+                </p:childTnLst>
+              </p:cTn>
+              <p:prevCondLst>
+                <p:cond evt="onPrev" delay="0">
+                  <p:tgtEl>
+                    <p:sldTgt/>
+                  </p:tgtEl>
+                </p:cond>
+              </p:prevCondLst>
+              <p:nextCondLst>
+                <p:cond evt="onNext" delay="0">
+                  <p:tgtEl>
+                    <p:sldTgt/>
+                  </p:tgtEl>
+                </p:cond>
+              </p:nextCondLst>
+            </p:seq>
+          </p:childTnLst>
+        </p:cTn>
+      </p:par>
+    </p:tnLst>
+  </p:timing>
 </p:sld>
 </file>
 
@@ -4065,6 +4401,142 @@
   <p:clrMapOvr>
     <a:masterClrMapping/>
   </p:clrMapOvr>
+  <p:timing>
+    <p:tnLst>
+      <p:par>
+        <p:cTn id="1" dur="indefinite" restart="never" nodeType="tmRoot">
+          <p:childTnLst>
+            <p:seq concurrent="1" nextAc="seek">
+              <p:cTn id="2" dur="indefinite" nodeType="mainSeq">
+                <p:childTnLst>
+                  <p:par>
+                    <p:cTn id="3" fill="hold">
+                      <p:stCondLst>
+                        <p:cond delay="indefinite"/>
+                      </p:stCondLst>
+                      <p:childTnLst>
+                        <p:par>
+                          <p:cTn id="4" fill="hold">
+                            <p:stCondLst>
+                              <p:cond delay="0"/>
+                            </p:stCondLst>
+                            <p:childTnLst>
+                              <p:par>
+                                <p:cTn id="5" presetID="9" presetClass="entr" presetSubtype="0" fill="hold" nodeType="clickEffect">
+                                  <p:stCondLst>
+                                    <p:cond delay="0"/>
+                                  </p:stCondLst>
+                                  <p:childTnLst>
+                                    <p:set>
+                                      <p:cBhvr>
+                                        <p:cTn id="6" dur="1" fill="hold">
+                                          <p:stCondLst>
+                                            <p:cond delay="0"/>
+                                          </p:stCondLst>
+                                        </p:cTn>
+                                        <p:tgtEl>
+                                          <p:spTgt spid="2054"/>
+                                        </p:tgtEl>
+                                        <p:attrNameLst>
+                                          <p:attrName>style.visibility</p:attrName>
+                                        </p:attrNameLst>
+                                      </p:cBhvr>
+                                      <p:to>
+                                        <p:strVal val="visible"/>
+                                      </p:to>
+                                    </p:set>
+                                    <p:animEffect transition="in" filter="dissolve">
+                                      <p:cBhvr>
+                                        <p:cTn id="7" dur="500"/>
+                                        <p:tgtEl>
+                                          <p:spTgt spid="2054"/>
+                                        </p:tgtEl>
+                                      </p:cBhvr>
+                                    </p:animEffect>
+                                  </p:childTnLst>
+                                </p:cTn>
+                              </p:par>
+                            </p:childTnLst>
+                          </p:cTn>
+                        </p:par>
+                      </p:childTnLst>
+                    </p:cTn>
+                  </p:par>
+                  <p:par>
+                    <p:cTn id="8" fill="hold">
+                      <p:stCondLst>
+                        <p:cond delay="indefinite"/>
+                      </p:stCondLst>
+                      <p:childTnLst>
+                        <p:par>
+                          <p:cTn id="9" fill="hold">
+                            <p:stCondLst>
+                              <p:cond delay="0"/>
+                            </p:stCondLst>
+                            <p:childTnLst>
+                              <p:par>
+                                <p:cTn id="10" presetID="9" presetClass="entr" presetSubtype="0" fill="hold" nodeType="clickEffect">
+                                  <p:stCondLst>
+                                    <p:cond delay="0"/>
+                                  </p:stCondLst>
+                                  <p:childTnLst>
+                                    <p:set>
+                                      <p:cBhvr>
+                                        <p:cTn id="11" dur="1" fill="hold">
+                                          <p:stCondLst>
+                                            <p:cond delay="0"/>
+                                          </p:stCondLst>
+                                        </p:cTn>
+                                        <p:tgtEl>
+                                          <p:spTgt spid="2050"/>
+                                        </p:tgtEl>
+                                        <p:attrNameLst>
+                                          <p:attrName>style.visibility</p:attrName>
+                                        </p:attrNameLst>
+                                      </p:cBhvr>
+                                      <p:to>
+                                        <p:strVal val="visible"/>
+                                      </p:to>
+                                    </p:set>
+                                    <p:animEffect transition="in" filter="dissolve">
+                                      <p:cBhvr>
+                                        <p:cTn id="12" dur="500"/>
+                                        <p:tgtEl>
+                                          <p:spTgt spid="2050"/>
+                                        </p:tgtEl>
+                                      </p:cBhvr>
+                                    </p:animEffect>
+                                  </p:childTnLst>
+                                </p:cTn>
+                              </p:par>
+                            </p:childTnLst>
+                          </p:cTn>
+                        </p:par>
+                      </p:childTnLst>
+                    </p:cTn>
+                  </p:par>
+                </p:childTnLst>
+              </p:cTn>
+              <p:prevCondLst>
+                <p:cond evt="onPrev" delay="0">
+                  <p:tgtEl>
+                    <p:sldTgt/>
+                  </p:tgtEl>
+                </p:cond>
+              </p:prevCondLst>
+              <p:nextCondLst>
+                <p:cond evt="onNext" delay="0">
+                  <p:tgtEl>
+                    <p:sldTgt/>
+                  </p:tgtEl>
+                </p:cond>
+              </p:nextCondLst>
+            </p:seq>
+          </p:childTnLst>
+        </p:cTn>
+      </p:par>
+    </p:tnLst>
+  </p:timing>
 </p:sld>
 </file>
 
@@ -4202,6 +4674,146 @@
   <p:clrMapOvr>
     <a:masterClrMapping/>
   </p:clrMapOvr>
+  <p:timing>
+    <p:tnLst>
+      <p:par>
+        <p:cTn id="1" dur="indefinite" restart="never" nodeType="tmRoot">
+          <p:childTnLst>
+            <p:seq concurrent="1" nextAc="seek">
+              <p:cTn id="2" dur="indefinite" nodeType="mainSeq">
+                <p:childTnLst>
+                  <p:par>
+                    <p:cTn id="3" fill="hold">
+                      <p:stCondLst>
+                        <p:cond delay="indefinite"/>
+                      </p:stCondLst>
+                      <p:childTnLst>
+                        <p:par>
+                          <p:cTn id="4" fill="hold">
+                            <p:stCondLst>
+                              <p:cond delay="0"/>
+                            </p:stCondLst>
+                            <p:childTnLst>
+                              <p:par>
+                                <p:cTn id="5" presetID="9" presetClass="entr" presetSubtype="0" fill="hold" grpId="0" nodeType="clickEffect">
+                                  <p:stCondLst>
+                                    <p:cond delay="0"/>
+                                  </p:stCondLst>
+                                  <p:childTnLst>
+                                    <p:set>
+                                      <p:cBhvr>
+                                        <p:cTn id="6" dur="1" fill="hold">
+                                          <p:stCondLst>
+                                            <p:cond delay="0"/>
+                                          </p:stCondLst>
+                                        </p:cTn>
+                                        <p:tgtEl>
+                                          <p:spTgt spid="3"/>
+                                        </p:tgtEl>
+                                        <p:attrNameLst>
+                                          <p:attrName>style.visibility</p:attrName>
+                                        </p:attrNameLst>
+                                      </p:cBhvr>
+                                      <p:to>
+                                        <p:strVal val="visible"/>
+                                      </p:to>
+                                    </p:set>
+                                    <p:animEffect transition="in" filter="dissolve">
+                                      <p:cBhvr>
+                                        <p:cTn id="7" dur="500"/>
+                                        <p:tgtEl>
+                                          <p:spTgt spid="3"/>
+                                        </p:tgtEl>
+                                      </p:cBhvr>
+                                    </p:animEffect>
+                                  </p:childTnLst>
+                                </p:cTn>
+                              </p:par>
+                            </p:childTnLst>
+                          </p:cTn>
+                        </p:par>
+                      </p:childTnLst>
+                    </p:cTn>
+                  </p:par>
+                  <p:par>
+                    <p:cTn id="8" fill="hold">
+                      <p:stCondLst>
+                        <p:cond delay="indefinite"/>
+                      </p:stCondLst>
+                      <p:childTnLst>
+                        <p:par>
+                          <p:cTn id="9" fill="hold">
+                            <p:stCondLst>
+                              <p:cond delay="0"/>
+                            </p:stCondLst>
+                            <p:childTnLst>
+                              <p:par>
+                                <p:cTn id="10" presetID="9" presetClass="entr" presetSubtype="0" fill="hold" grpId="0" nodeType="clickEffect">
+                                  <p:stCondLst>
+                                    <p:cond delay="0"/>
+                                  </p:stCondLst>
+                                  <p:childTnLst>
+                                    <p:set>
+                                      <p:cBhvr>
+                                        <p:cTn id="11" dur="1" fill="hold">
+                                          <p:stCondLst>
+                                            <p:cond delay="0"/>
+                                          </p:stCondLst>
+                                        </p:cTn>
+                                        <p:tgtEl>
+                                          <p:spTgt spid="4"/>
+                                        </p:tgtEl>
+                                        <p:attrNameLst>
+                                          <p:attrName>style.visibility</p:attrName>
+                                        </p:attrNameLst>
+                                      </p:cBhvr>
+                                      <p:to>
+                                        <p:strVal val="visible"/>
+                                      </p:to>
+                                    </p:set>
+                                    <p:animEffect transition="in" filter="dissolve">
+                                      <p:cBhvr>
+                                        <p:cTn id="12" dur="500"/>
+                                        <p:tgtEl>
+                                          <p:spTgt spid="4"/>
+                                        </p:tgtEl>
+                                      </p:cBhvr>
+                                    </p:animEffect>
+                                  </p:childTnLst>
+                                </p:cTn>
+                              </p:par>
+                            </p:childTnLst>
+                          </p:cTn>
+                        </p:par>
+                      </p:childTnLst>
+                    </p:cTn>
+                  </p:par>
+                </p:childTnLst>
+              </p:cTn>
+              <p:prevCondLst>
+                <p:cond evt="onPrev" delay="0">
+                  <p:tgtEl>
+                    <p:sldTgt/>
+                  </p:tgtEl>
+                </p:cond>
+              </p:prevCondLst>
+              <p:nextCondLst>
+                <p:cond evt="onNext" delay="0">
+                  <p:tgtEl>
+                    <p:sldTgt/>
+                  </p:tgtEl>
+                </p:cond>
+              </p:nextCondLst>
+            </p:seq>
+          </p:childTnLst>
+        </p:cTn>
+      </p:par>
+    </p:tnLst>
+    <p:bldLst>
+      <p:bldP spid="3" grpId="0"/>
+      <p:bldP spid="4" grpId="0"/>
+    </p:bldLst>
+  </p:timing>
 </p:sld>
 </file>
 
@@ -4614,6 +5226,606 @@
   <p:clrMapOvr>
     <a:masterClrMapping/>
   </p:clrMapOvr>
+  <p:timing>
+    <p:tnLst>
+      <p:par>
+        <p:cTn id="1" dur="indefinite" restart="never" nodeType="tmRoot">
+          <p:childTnLst>
+            <p:seq concurrent="1" nextAc="seek">
+              <p:cTn id="2" dur="indefinite" nodeType="mainSeq">
+                <p:childTnLst>
+                  <p:par>
+                    <p:cTn id="3" fill="hold">
+                      <p:stCondLst>
+                        <p:cond delay="indefinite"/>
+                      </p:stCondLst>
+                      <p:childTnLst>
+                        <p:par>
+                          <p:cTn id="4" fill="hold">
+                            <p:stCondLst>
+                              <p:cond delay="0"/>
+                            </p:stCondLst>
+                            <p:childTnLst>
+                              <p:par>
+                                <p:cTn id="5" presetID="2" presetClass="entr" presetSubtype="8" fill="hold" grpId="0" nodeType="clickEffect">
+                                  <p:stCondLst>
+                                    <p:cond delay="0"/>
+                                  </p:stCondLst>
+                                  <p:childTnLst>
+                                    <p:set>
+                                      <p:cBhvr>
+                                        <p:cTn id="6" dur="1" fill="hold">
+                                          <p:stCondLst>
+                                            <p:cond delay="0"/>
+                                          </p:stCondLst>
+                                        </p:cTn>
+                                        <p:tgtEl>
+                                          <p:spTgt spid="3"/>
+                                        </p:tgtEl>
+                                        <p:attrNameLst>
+                                          <p:attrName>style.visibility</p:attrName>
+                                        </p:attrNameLst>
+                                      </p:cBhvr>
+                                      <p:to>
+                                        <p:strVal val="visible"/>
+                                      </p:to>
+                                    </p:set>
+                                    <p:anim calcmode="lin" valueType="num">
+                                      <p:cBhvr additive="base">
+                                        <p:cTn id="7" dur="500" fill="hold"/>
+                                        <p:tgtEl>
+                                          <p:spTgt spid="3"/>
+                                        </p:tgtEl>
+                                        <p:attrNameLst>
+                                          <p:attrName>ppt_x</p:attrName>
+                                        </p:attrNameLst>
+                                      </p:cBhvr>
+                                      <p:tavLst>
+                                        <p:tav tm="0">
+                                          <p:val>
+                                            <p:strVal val="0-#ppt_w/2"/>
+                                          </p:val>
+                                        </p:tav>
+                                        <p:tav tm="100000">
+                                          <p:val>
+                                            <p:strVal val="#ppt_x"/>
+                                          </p:val>
+                                        </p:tav>
+                                      </p:tavLst>
+                                    </p:anim>
+                                    <p:anim calcmode="lin" valueType="num">
+                                      <p:cBhvr additive="base">
+                                        <p:cTn id="8" dur="500" fill="hold"/>
+                                        <p:tgtEl>
+                                          <p:spTgt spid="3"/>
+                                        </p:tgtEl>
+                                        <p:attrNameLst>
+                                          <p:attrName>ppt_y</p:attrName>
+                                        </p:attrNameLst>
+                                      </p:cBhvr>
+                                      <p:tavLst>
+                                        <p:tav tm="0">
+                                          <p:val>
+                                            <p:strVal val="#ppt_y"/>
+                                          </p:val>
+                                        </p:tav>
+                                        <p:tav tm="100000">
+                                          <p:val>
+                                            <p:strVal val="#ppt_y"/>
+                                          </p:val>
+                                        </p:tav>
+                                      </p:tavLst>
+                                    </p:anim>
+                                  </p:childTnLst>
+                                </p:cTn>
+                              </p:par>
+                              <p:par>
+                                <p:cTn id="9" presetID="2" presetClass="entr" presetSubtype="8" fill="hold" nodeType="withEffect">
+                                  <p:stCondLst>
+                                    <p:cond delay="0"/>
+                                  </p:stCondLst>
+                                  <p:childTnLst>
+                                    <p:set>
+                                      <p:cBhvr>
+                                        <p:cTn id="10" dur="1" fill="hold">
+                                          <p:stCondLst>
+                                            <p:cond delay="0"/>
+                                          </p:stCondLst>
+                                        </p:cTn>
+                                        <p:tgtEl>
+                                          <p:spTgt spid="4100"/>
+                                        </p:tgtEl>
+                                        <p:attrNameLst>
+                                          <p:attrName>style.visibility</p:attrName>
+                                        </p:attrNameLst>
+                                      </p:cBhvr>
+                                      <p:to>
+                                        <p:strVal val="visible"/>
+                                      </p:to>
+                                    </p:set>
+                                    <p:anim calcmode="lin" valueType="num">
+                                      <p:cBhvr additive="base">
+                                        <p:cTn id="11" dur="500" fill="hold"/>
+                                        <p:tgtEl>
+                                          <p:spTgt spid="4100"/>
+                                        </p:tgtEl>
+                                        <p:attrNameLst>
+                                          <p:attrName>ppt_x</p:attrName>
+                                        </p:attrNameLst>
+                                      </p:cBhvr>
+                                      <p:tavLst>
+                                        <p:tav tm="0">
+                                          <p:val>
+                                            <p:strVal val="0-#ppt_w/2"/>
+                                          </p:val>
+                                        </p:tav>
+                                        <p:tav tm="100000">
+                                          <p:val>
+                                            <p:strVal val="#ppt_x"/>
+                                          </p:val>
+                                        </p:tav>
+                                      </p:tavLst>
+                                    </p:anim>
+                                    <p:anim calcmode="lin" valueType="num">
+                                      <p:cBhvr additive="base">
+                                        <p:cTn id="12" dur="500" fill="hold"/>
+                                        <p:tgtEl>
+                                          <p:spTgt spid="4100"/>
+                                        </p:tgtEl>
+                                        <p:attrNameLst>
+                                          <p:attrName>ppt_y</p:attrName>
+                                        </p:attrNameLst>
+                                      </p:cBhvr>
+                                      <p:tavLst>
+                                        <p:tav tm="0">
+                                          <p:val>
+                                            <p:strVal val="#ppt_y"/>
+                                          </p:val>
+                                        </p:tav>
+                                        <p:tav tm="100000">
+                                          <p:val>
+                                            <p:strVal val="#ppt_y"/>
+                                          </p:val>
+                                        </p:tav>
+                                      </p:tavLst>
+                                    </p:anim>
+                                  </p:childTnLst>
+                                </p:cTn>
+                              </p:par>
+                            </p:childTnLst>
+                          </p:cTn>
+                        </p:par>
+                      </p:childTnLst>
+                    </p:cTn>
+                  </p:par>
+                  <p:par>
+                    <p:cTn id="13" fill="hold">
+                      <p:stCondLst>
+                        <p:cond delay="indefinite"/>
+                      </p:stCondLst>
+                      <p:childTnLst>
+                        <p:par>
+                          <p:cTn id="14" fill="hold">
+                            <p:stCondLst>
+                              <p:cond delay="0"/>
+                            </p:stCondLst>
+                            <p:childTnLst>
+                              <p:par>
+                                <p:cTn id="15" presetID="2" presetClass="entr" presetSubtype="2" fill="hold" nodeType="clickEffect">
+                                  <p:stCondLst>
+                                    <p:cond delay="0"/>
+                                  </p:stCondLst>
+                                  <p:childTnLst>
+                                    <p:set>
+                                      <p:cBhvr>
+                                        <p:cTn id="16" dur="1" fill="hold">
+                                          <p:stCondLst>
+                                            <p:cond delay="0"/>
+                                          </p:stCondLst>
+                                        </p:cTn>
+                                        <p:tgtEl>
+                                          <p:spTgt spid="4098"/>
+                                        </p:tgtEl>
+                                        <p:attrNameLst>
+                                          <p:attrName>style.visibility</p:attrName>
+                                        </p:attrNameLst>
+                                      </p:cBhvr>
+                                      <p:to>
+                                        <p:strVal val="visible"/>
+                                      </p:to>
+                                    </p:set>
+                                    <p:anim calcmode="lin" valueType="num">
+                                      <p:cBhvr additive="base">
+                                        <p:cTn id="17" dur="500" fill="hold"/>
+                                        <p:tgtEl>
+                                          <p:spTgt spid="4098"/>
+                                        </p:tgtEl>
+                                        <p:attrNameLst>
+                                          <p:attrName>ppt_x</p:attrName>
+                                        </p:attrNameLst>
+                                      </p:cBhvr>
+                                      <p:tavLst>
+                                        <p:tav tm="0">
+                                          <p:val>
+                                            <p:strVal val="1+#ppt_w/2"/>
+                                          </p:val>
+                                        </p:tav>
+                                        <p:tav tm="100000">
+                                          <p:val>
+                                            <p:strVal val="#ppt_x"/>
+                                          </p:val>
+                                        </p:tav>
+                                      </p:tavLst>
+                                    </p:anim>
+                                    <p:anim calcmode="lin" valueType="num">
+                                      <p:cBhvr additive="base">
+                                        <p:cTn id="18" dur="500" fill="hold"/>
+                                        <p:tgtEl>
+                                          <p:spTgt spid="4098"/>
+                                        </p:tgtEl>
+                                        <p:attrNameLst>
+                                          <p:attrName>ppt_y</p:attrName>
+                                        </p:attrNameLst>
+                                      </p:cBhvr>
+                                      <p:tavLst>
+                                        <p:tav tm="0">
+                                          <p:val>
+                                            <p:strVal val="#ppt_y"/>
+                                          </p:val>
+                                        </p:tav>
+                                        <p:tav tm="100000">
+                                          <p:val>
+                                            <p:strVal val="#ppt_y"/>
+                                          </p:val>
+                                        </p:tav>
+                                      </p:tavLst>
+                                    </p:anim>
+                                  </p:childTnLst>
+                                </p:cTn>
+                              </p:par>
+                              <p:par>
+                                <p:cTn id="19" presetID="2" presetClass="entr" presetSubtype="2" fill="hold" grpId="0" nodeType="withEffect">
+                                  <p:stCondLst>
+                                    <p:cond delay="0"/>
+                                  </p:stCondLst>
+                                  <p:childTnLst>
+                                    <p:set>
+                                      <p:cBhvr>
+                                        <p:cTn id="20" dur="1" fill="hold">
+                                          <p:stCondLst>
+                                            <p:cond delay="0"/>
+                                          </p:stCondLst>
+                                        </p:cTn>
+                                        <p:tgtEl>
+                                          <p:spTgt spid="5"/>
+                                        </p:tgtEl>
+                                        <p:attrNameLst>
+                                          <p:attrName>style.visibility</p:attrName>
+                                        </p:attrNameLst>
+                                      </p:cBhvr>
+                                      <p:to>
+                                        <p:strVal val="visible"/>
+                                      </p:to>
+                                    </p:set>
+                                    <p:anim calcmode="lin" valueType="num">
+                                      <p:cBhvr additive="base">
+                                        <p:cTn id="21" dur="500" fill="hold"/>
+                                        <p:tgtEl>
+                                          <p:spTgt spid="5"/>
+                                        </p:tgtEl>
+                                        <p:attrNameLst>
+                                          <p:attrName>ppt_x</p:attrName>
+                                        </p:attrNameLst>
+                                      </p:cBhvr>
+                                      <p:tavLst>
+                                        <p:tav tm="0">
+                                          <p:val>
+                                            <p:strVal val="1+#ppt_w/2"/>
+                                          </p:val>
+                                        </p:tav>
+                                        <p:tav tm="100000">
+                                          <p:val>
+                                            <p:strVal val="#ppt_x"/>
+                                          </p:val>
+                                        </p:tav>
+                                      </p:tavLst>
+                                    </p:anim>
+                                    <p:anim calcmode="lin" valueType="num">
+                                      <p:cBhvr additive="base">
+                                        <p:cTn id="22" dur="500" fill="hold"/>
+                                        <p:tgtEl>
+                                          <p:spTgt spid="5"/>
+                                        </p:tgtEl>
+                                        <p:attrNameLst>
+                                          <p:attrName>ppt_y</p:attrName>
+                                        </p:attrNameLst>
+                                      </p:cBhvr>
+                                      <p:tavLst>
+                                        <p:tav tm="0">
+                                          <p:val>
+                                            <p:strVal val="#ppt_y"/>
+                                          </p:val>
+                                        </p:tav>
+                                        <p:tav tm="100000">
+                                          <p:val>
+                                            <p:strVal val="#ppt_y"/>
+                                          </p:val>
+                                        </p:tav>
+                                      </p:tavLst>
+                                    </p:anim>
+                                  </p:childTnLst>
+                                </p:cTn>
+                              </p:par>
+                            </p:childTnLst>
+                          </p:cTn>
+                        </p:par>
+                      </p:childTnLst>
+                    </p:cTn>
+                  </p:par>
+                  <p:par>
+                    <p:cTn id="23" fill="hold">
+                      <p:stCondLst>
+                        <p:cond delay="indefinite"/>
+                      </p:stCondLst>
+                      <p:childTnLst>
+                        <p:par>
+                          <p:cTn id="24" fill="hold">
+                            <p:stCondLst>
+                              <p:cond delay="0"/>
+                            </p:stCondLst>
+                            <p:childTnLst>
+                              <p:par>
+                                <p:cTn id="25" presetID="2" presetClass="entr" presetSubtype="8" fill="hold" nodeType="clickEffect">
+                                  <p:stCondLst>
+                                    <p:cond delay="0"/>
+                                  </p:stCondLst>
+                                  <p:childTnLst>
+                                    <p:set>
+                                      <p:cBhvr>
+                                        <p:cTn id="26" dur="1" fill="hold">
+                                          <p:stCondLst>
+                                            <p:cond delay="0"/>
+                                          </p:stCondLst>
+                                        </p:cTn>
+                                        <p:tgtEl>
+                                          <p:spTgt spid="4110"/>
+                                        </p:tgtEl>
+                                        <p:attrNameLst>
+                                          <p:attrName>style.visibility</p:attrName>
+                                        </p:attrNameLst>
+                                      </p:cBhvr>
+                                      <p:to>
+                                        <p:strVal val="visible"/>
+                                      </p:to>
+                                    </p:set>
+                                    <p:anim calcmode="lin" valueType="num">
+                                      <p:cBhvr additive="base">
+                                        <p:cTn id="27" dur="500" fill="hold"/>
+                                        <p:tgtEl>
+                                          <p:spTgt spid="4110"/>
+                                        </p:tgtEl>
+                                        <p:attrNameLst>
+                                          <p:attrName>ppt_x</p:attrName>
+                                        </p:attrNameLst>
+                                      </p:cBhvr>
+                                      <p:tavLst>
+                                        <p:tav tm="0">
+                                          <p:val>
+                                            <p:strVal val="0-#ppt_w/2"/>
+                                          </p:val>
+                                        </p:tav>
+                                        <p:tav tm="100000">
+                                          <p:val>
+                                            <p:strVal val="#ppt_x"/>
+                                          </p:val>
+                                        </p:tav>
+                                      </p:tavLst>
+                                    </p:anim>
+                                    <p:anim calcmode="lin" valueType="num">
+                                      <p:cBhvr additive="base">
+                                        <p:cTn id="28" dur="500" fill="hold"/>
+                                        <p:tgtEl>
+                                          <p:spTgt spid="4110"/>
+                                        </p:tgtEl>
+                                        <p:attrNameLst>
+                                          <p:attrName>ppt_y</p:attrName>
+                                        </p:attrNameLst>
+                                      </p:cBhvr>
+                                      <p:tavLst>
+                                        <p:tav tm="0">
+                                          <p:val>
+                                            <p:strVal val="#ppt_y"/>
+                                          </p:val>
+                                        </p:tav>
+                                        <p:tav tm="100000">
+                                          <p:val>
+                                            <p:strVal val="#ppt_y"/>
+                                          </p:val>
+                                        </p:tav>
+                                      </p:tavLst>
+                                    </p:anim>
+                                  </p:childTnLst>
+                                </p:cTn>
+                              </p:par>
+                              <p:par>
+                                <p:cTn id="29" presetID="2" presetClass="entr" presetSubtype="8" fill="hold" nodeType="withEffect">
+                                  <p:stCondLst>
+                                    <p:cond delay="0"/>
+                                  </p:stCondLst>
+                                  <p:childTnLst>
+                                    <p:set>
+                                      <p:cBhvr>
+                                        <p:cTn id="30" dur="1" fill="hold">
+                                          <p:stCondLst>
+                                            <p:cond delay="0"/>
+                                          </p:stCondLst>
+                                        </p:cTn>
+                                        <p:tgtEl>
+                                          <p:spTgt spid="4108"/>
+                                        </p:tgtEl>
+                                        <p:attrNameLst>
+                                          <p:attrName>style.visibility</p:attrName>
+                                        </p:attrNameLst>
+                                      </p:cBhvr>
+                                      <p:to>
+                                        <p:strVal val="visible"/>
+                                      </p:to>
+                                    </p:set>
+                                    <p:anim calcmode="lin" valueType="num">
+                                      <p:cBhvr additive="base">
+                                        <p:cTn id="31" dur="500" fill="hold"/>
+                                        <p:tgtEl>
+                                          <p:spTgt spid="4108"/>
+                                        </p:tgtEl>
+                                        <p:attrNameLst>
+                                          <p:attrName>ppt_x</p:attrName>
+                                        </p:attrNameLst>
+                                      </p:cBhvr>
+                                      <p:tavLst>
+                                        <p:tav tm="0">
+                                          <p:val>
+                                            <p:strVal val="0-#ppt_w/2"/>
+                                          </p:val>
+                                        </p:tav>
+                                        <p:tav tm="100000">
+                                          <p:val>
+                                            <p:strVal val="#ppt_x"/>
+                                          </p:val>
+                                        </p:tav>
+                                      </p:tavLst>
+                                    </p:anim>
+                                    <p:anim calcmode="lin" valueType="num">
+                                      <p:cBhvr additive="base">
+                                        <p:cTn id="32" dur="500" fill="hold"/>
+                                        <p:tgtEl>
+                                          <p:spTgt spid="4108"/>
+                                        </p:tgtEl>
+                                        <p:attrNameLst>
+                                          <p:attrName>ppt_y</p:attrName>
+                                        </p:attrNameLst>
+                                      </p:cBhvr>
+                                      <p:tavLst>
+                                        <p:tav tm="0">
+                                          <p:val>
+                                            <p:strVal val="#ppt_y"/>
+                                          </p:val>
+                                        </p:tav>
+                                        <p:tav tm="100000">
+                                          <p:val>
+                                            <p:strVal val="#ppt_y"/>
+                                          </p:val>
+                                        </p:tav>
+                                      </p:tavLst>
+                                    </p:anim>
+                                  </p:childTnLst>
+                                </p:cTn>
+                              </p:par>
+                              <p:par>
+                                <p:cTn id="33" presetID="2" presetClass="entr" presetSubtype="8" fill="hold" grpId="0" nodeType="withEffect">
+                                  <p:stCondLst>
+                                    <p:cond delay="0"/>
+                                  </p:stCondLst>
+                                  <p:childTnLst>
+                                    <p:set>
+                                      <p:cBhvr>
+                                        <p:cTn id="34" dur="1" fill="hold">
+                                          <p:stCondLst>
+                                            <p:cond delay="0"/>
+                                          </p:stCondLst>
+                                        </p:cTn>
+                                        <p:tgtEl>
+                                          <p:spTgt spid="6"/>
+                                        </p:tgtEl>
+                                        <p:attrNameLst>
+                                          <p:attrName>style.visibility</p:attrName>
+                                        </p:attrNameLst>
+                                      </p:cBhvr>
+                                      <p:to>
+                                        <p:strVal val="visible"/>
+                                      </p:to>
+                                    </p:set>
+                                    <p:anim calcmode="lin" valueType="num">
+                                      <p:cBhvr additive="base">
+                                        <p:cTn id="35" dur="500" fill="hold"/>
+                                        <p:tgtEl>
+                                          <p:spTgt spid="6"/>
+                                        </p:tgtEl>
+                                        <p:attrNameLst>
+                                          <p:attrName>ppt_x</p:attrName>
+                                        </p:attrNameLst>
+                                      </p:cBhvr>
+                                      <p:tavLst>
+                                        <p:tav tm="0">
+                                          <p:val>
+                                            <p:strVal val="0-#ppt_w/2"/>
+                                          </p:val>
+                                        </p:tav>
+                                        <p:tav tm="100000">
+                                          <p:val>
+                                            <p:strVal val="#ppt_x"/>
+                                          </p:val>
+                                        </p:tav>
+                                      </p:tavLst>
+                                    </p:anim>
+                                    <p:anim calcmode="lin" valueType="num">
+                                      <p:cBhvr additive="base">
+                                        <p:cTn id="36" dur="500" fill="hold"/>
+                                        <p:tgtEl>
+                                          <p:spTgt spid="6"/>
+                                        </p:tgtEl>
+                                        <p:attrNameLst>
+                                          <p:attrName>ppt_y</p:attrName>
+                                        </p:attrNameLst>
+                                      </p:cBhvr>
+                                      <p:tavLst>
+                                        <p:tav tm="0">
+                                          <p:val>
+                                            <p:strVal val="#ppt_y"/>
+                                          </p:val>
+                                        </p:tav>
+                                        <p:tav tm="100000">
+                                          <p:val>
+                                            <p:strVal val="#ppt_y"/>
+                                          </p:val>
+                                        </p:tav>
+                                      </p:tavLst>
+                                    </p:anim>
+                                  </p:childTnLst>
+                                </p:cTn>
+                              </p:par>
+                            </p:childTnLst>
+                          </p:cTn>
+                        </p:par>
+                      </p:childTnLst>
+                    </p:cTn>
+                  </p:par>
+                </p:childTnLst>
+              </p:cTn>
+              <p:prevCondLst>
+                <p:cond evt="onPrev" delay="0">
+                  <p:tgtEl>
+                    <p:sldTgt/>
+                  </p:tgtEl>
+                </p:cond>
+              </p:prevCondLst>
+              <p:nextCondLst>
+                <p:cond evt="onNext" delay="0">
+                  <p:tgtEl>
+                    <p:sldTgt/>
+                  </p:tgtEl>
+                </p:cond>
+              </p:nextCondLst>
+            </p:seq>
+          </p:childTnLst>
+        </p:cTn>
+      </p:par>
+    </p:tnLst>
+    <p:bldLst>
+      <p:bldP spid="3" grpId="0"/>
+      <p:bldP spid="5" grpId="0"/>
+      <p:bldP spid="6" grpId="0"/>
+    </p:bldLst>
+  </p:timing>
 </p:sld>
 </file>
 
@@ -4724,6 +5936,130 @@
   <p:clrMapOvr>
     <a:masterClrMapping/>
   </p:clrMapOvr>
+  <p:timing>
+    <p:tnLst>
+      <p:par>
+        <p:cTn id="1" dur="indefinite" restart="never" nodeType="tmRoot">
+          <p:childTnLst>
+            <p:seq concurrent="1" nextAc="seek">
+              <p:cTn id="2" dur="indefinite" nodeType="mainSeq">
+                <p:childTnLst>
+                  <p:par>
+                    <p:cTn id="3" fill="hold">
+                      <p:stCondLst>
+                        <p:cond delay="indefinite"/>
+                        <p:cond evt="onBegin" delay="0">
+                          <p:tn val="2"/>
+                        </p:cond>
+                      </p:stCondLst>
+                      <p:childTnLst>
+                        <p:par>
+                          <p:cTn id="4" fill="hold">
+                            <p:stCondLst>
+                              <p:cond delay="0"/>
+                            </p:stCondLst>
+                            <p:childTnLst>
+                              <p:par>
+                                <p:cTn id="5" presetID="23" presetClass="entr" presetSubtype="16" fill="hold" nodeType="withEffect">
+                                  <p:stCondLst>
+                                    <p:cond delay="0"/>
+                                  </p:stCondLst>
+                                  <p:childTnLst>
+                                    <p:set>
+                                      <p:cBhvr>
+                                        <p:cTn id="6" dur="1" fill="hold">
+                                          <p:stCondLst>
+                                            <p:cond delay="0"/>
+                                          </p:stCondLst>
+                                        </p:cTn>
+                                        <p:tgtEl>
+                                          <p:spTgt spid="9218"/>
+                                        </p:tgtEl>
+                                        <p:attrNameLst>
+                                          <p:attrName>style.visibility</p:attrName>
+                                        </p:attrNameLst>
+                                      </p:cBhvr>
+                                      <p:to>
+                                        <p:strVal val="visible"/>
+                                      </p:to>
+                                    </p:set>
+                                    <p:anim calcmode="lin" valueType="num">
+                                      <p:cBhvr>
+                                        <p:cTn id="7" dur="2000" fill="hold"/>
+                                        <p:tgtEl>
+                                          <p:spTgt spid="9218"/>
+                                        </p:tgtEl>
+                                        <p:attrNameLst>
+                                          <p:attrName>ppt_w</p:attrName>
+                                        </p:attrNameLst>
+                                      </p:cBhvr>
+                                      <p:tavLst>
+                                        <p:tav tm="0">
+                                          <p:val>
+                                            <p:fltVal val="0"/>
+                                          </p:val>
+                                        </p:tav>
+                                        <p:tav tm="100000">
+                                          <p:val>
+                                            <p:strVal val="#ppt_w"/>
+                                          </p:val>
+                                        </p:tav>
+                                      </p:tavLst>
+                                    </p:anim>
+                                    <p:anim calcmode="lin" valueType="num">
+                                      <p:cBhvr>
+                                        <p:cTn id="8" dur="2000" fill="hold"/>
+                                        <p:tgtEl>
+                                          <p:spTgt spid="9218"/>
+                                        </p:tgtEl>
+                                        <p:attrNameLst>
+                                          <p:attrName>ppt_h</p:attrName>
+                                        </p:attrNameLst>
+                                      </p:cBhvr>
+                                      <p:tavLst>
+                                        <p:tav tm="0">
+                                          <p:val>
+                                            <p:fltVal val="0"/>
+                                          </p:val>
+                                        </p:tav>
+                                        <p:tav tm="100000">
+                                          <p:val>
+                                            <p:strVal val="#ppt_h"/>
+                                          </p:val>
+                                        </p:tav>
+                                      </p:tavLst>
+                                    </p:anim>
+                                  </p:childTnLst>
+                                </p:cTn>
+                              </p:par>
+                            </p:childTnLst>
+                          </p:cTn>
+                        </p:par>
+                      </p:childTnLst>
+                    </p:cTn>
+                  </p:par>
+                </p:childTnLst>
+              </p:cTn>
+              <p:prevCondLst>
+                <p:cond evt="onPrev" delay="0">
+                  <p:tgtEl>
+                    <p:sldTgt/>
+                  </p:tgtEl>
+                </p:cond>
+              </p:prevCondLst>
+              <p:nextCondLst>
+                <p:cond evt="onNext" delay="0">
+                  <p:tgtEl>
+                    <p:sldTgt/>
+                  </p:tgtEl>
+                </p:cond>
+              </p:nextCondLst>
+            </p:seq>
+          </p:childTnLst>
+        </p:cTn>
+      </p:par>
+    </p:tnLst>
+  </p:timing>
 </p:sld>
 </file>
 
@@ -4834,6 +6170,130 @@
   <p:clrMapOvr>
     <a:masterClrMapping/>
   </p:clrMapOvr>
+  <p:timing>
+    <p:tnLst>
+      <p:par>
+        <p:cTn id="1" dur="indefinite" restart="never" nodeType="tmRoot">
+          <p:childTnLst>
+            <p:seq concurrent="1" nextAc="seek">
+              <p:cTn id="2" dur="indefinite" nodeType="mainSeq">
+                <p:childTnLst>
+                  <p:par>
+                    <p:cTn id="3" fill="hold">
+                      <p:stCondLst>
+                        <p:cond delay="indefinite"/>
+                        <p:cond evt="onBegin" delay="0">
+                          <p:tn val="2"/>
+                        </p:cond>
+                      </p:stCondLst>
+                      <p:childTnLst>
+                        <p:par>
+                          <p:cTn id="4" fill="hold">
+                            <p:stCondLst>
+                              <p:cond delay="0"/>
+                            </p:stCondLst>
+                            <p:childTnLst>
+                              <p:par>
+                                <p:cTn id="5" presetID="23" presetClass="entr" presetSubtype="16" fill="hold" nodeType="withEffect">
+                                  <p:stCondLst>
+                                    <p:cond delay="0"/>
+                                  </p:stCondLst>
+                                  <p:childTnLst>
+                                    <p:set>
+                                      <p:cBhvr>
+                                        <p:cTn id="6" dur="1" fill="hold">
+                                          <p:stCondLst>
+                                            <p:cond delay="0"/>
+                                          </p:stCondLst>
+                                        </p:cTn>
+                                        <p:tgtEl>
+                                          <p:spTgt spid="11266"/>
+                                        </p:tgtEl>
+                                        <p:attrNameLst>
+                                          <p:attrName>style.visibility</p:attrName>
+                                        </p:attrNameLst>
+                                      </p:cBhvr>
+                                      <p:to>
+                                        <p:strVal val="visible"/>
+                                      </p:to>
+                                    </p:set>
+                                    <p:anim calcmode="lin" valueType="num">
+                                      <p:cBhvr>
+                                        <p:cTn id="7" dur="2000" fill="hold"/>
+                                        <p:tgtEl>
+                                          <p:spTgt spid="11266"/>
+                                        </p:tgtEl>
+                                        <p:attrNameLst>
+                                          <p:attrName>ppt_w</p:attrName>
+                                        </p:attrNameLst>
+                                      </p:cBhvr>
+                                      <p:tavLst>
+                                        <p:tav tm="0">
+                                          <p:val>
+                                            <p:fltVal val="0"/>
+                                          </p:val>
+                                        </p:tav>
+                                        <p:tav tm="100000">
+                                          <p:val>
+                                            <p:strVal val="#ppt_w"/>
+                                          </p:val>
+                                        </p:tav>
+                                      </p:tavLst>
+                                    </p:anim>
+                                    <p:anim calcmode="lin" valueType="num">
+                                      <p:cBhvr>
+                                        <p:cTn id="8" dur="2000" fill="hold"/>
+                                        <p:tgtEl>
+                                          <p:spTgt spid="11266"/>
+                                        </p:tgtEl>
+                                        <p:attrNameLst>
+                                          <p:attrName>ppt_h</p:attrName>
+                                        </p:attrNameLst>
+                                      </p:cBhvr>
+                                      <p:tavLst>
+                                        <p:tav tm="0">
+                                          <p:val>
+                                            <p:fltVal val="0"/>
+                                          </p:val>
+                                        </p:tav>
+                                        <p:tav tm="100000">
+                                          <p:val>
+                                            <p:strVal val="#ppt_h"/>
+                                          </p:val>
+                                        </p:tav>
+                                      </p:tavLst>
+                                    </p:anim>
+                                  </p:childTnLst>
+                                </p:cTn>
+                              </p:par>
+                            </p:childTnLst>
+                          </p:cTn>
+                        </p:par>
+                      </p:childTnLst>
+                    </p:cTn>
+                  </p:par>
+                </p:childTnLst>
+              </p:cTn>
+              <p:prevCondLst>
+                <p:cond evt="onPrev" delay="0">
+                  <p:tgtEl>
+                    <p:sldTgt/>
+                  </p:tgtEl>
+                </p:cond>
+              </p:prevCondLst>
+              <p:nextCondLst>
+                <p:cond evt="onNext" delay="0">
+                  <p:tgtEl>
+                    <p:sldTgt/>
+                  </p:tgtEl>
+                </p:cond>
+              </p:nextCondLst>
+            </p:seq>
+          </p:childTnLst>
+        </p:cTn>
+      </p:par>
+    </p:tnLst>
+  </p:timing>
 </p:sld>
 </file>
 
@@ -5061,6 +6521,275 @@
   <p:clrMapOvr>
     <a:masterClrMapping/>
   </p:clrMapOvr>
+  <p:timing>
+    <p:tnLst>
+      <p:par>
+        <p:cTn id="1" dur="indefinite" restart="never" nodeType="tmRoot">
+          <p:childTnLst>
+            <p:seq concurrent="1" nextAc="seek">
+              <p:cTn id="2" dur="indefinite" nodeType="mainSeq">
+                <p:childTnLst>
+                  <p:par>
+                    <p:cTn id="3" fill="hold">
+                      <p:stCondLst>
+                        <p:cond delay="indefinite"/>
+                      </p:stCondLst>
+                      <p:childTnLst>
+                        <p:par>
+                          <p:cTn id="4" fill="hold">
+                            <p:stCondLst>
+                              <p:cond delay="0"/>
+                            </p:stCondLst>
+                            <p:childTnLst>
+                              <p:par>
+                                <p:cTn id="5" presetID="9" presetClass="entr" presetSubtype="0" fill="hold" grpId="0" nodeType="clickEffect">
+                                  <p:stCondLst>
+                                    <p:cond delay="0"/>
+                                  </p:stCondLst>
+                                  <p:childTnLst>
+                                    <p:set>
+                                      <p:cBhvr>
+                                        <p:cTn id="6" dur="1" fill="hold">
+                                          <p:stCondLst>
+                                            <p:cond delay="0"/>
+                                          </p:stCondLst>
+                                        </p:cTn>
+                                        <p:tgtEl>
+                                          <p:spTgt spid="8"/>
+                                        </p:tgtEl>
+                                        <p:attrNameLst>
+                                          <p:attrName>style.visibility</p:attrName>
+                                        </p:attrNameLst>
+                                      </p:cBhvr>
+                                      <p:to>
+                                        <p:strVal val="visible"/>
+                                      </p:to>
+                                    </p:set>
+                                    <p:animEffect transition="in" filter="dissolve">
+                                      <p:cBhvr>
+                                        <p:cTn id="7" dur="500"/>
+                                        <p:tgtEl>
+                                          <p:spTgt spid="8"/>
+                                        </p:tgtEl>
+                                      </p:cBhvr>
+                                    </p:animEffect>
+                                  </p:childTnLst>
+                                </p:cTn>
+                              </p:par>
+                            </p:childTnLst>
+                          </p:cTn>
+                        </p:par>
+                      </p:childTnLst>
+                    </p:cTn>
+                  </p:par>
+                  <p:par>
+                    <p:cTn id="8" fill="hold">
+                      <p:stCondLst>
+                        <p:cond delay="indefinite"/>
+                      </p:stCondLst>
+                      <p:childTnLst>
+                        <p:par>
+                          <p:cTn id="9" fill="hold">
+                            <p:stCondLst>
+                              <p:cond delay="0"/>
+                            </p:stCondLst>
+                            <p:childTnLst>
+                              <p:par>
+                                <p:cTn id="10" presetID="9" presetClass="entr" presetSubtype="0" fill="hold" nodeType="clickEffect">
+                                  <p:stCondLst>
+                                    <p:cond delay="0"/>
+                                  </p:stCondLst>
+                                  <p:childTnLst>
+                                    <p:set>
+                                      <p:cBhvr>
+                                        <p:cTn id="11" dur="1" fill="hold">
+                                          <p:stCondLst>
+                                            <p:cond delay="0"/>
+                                          </p:stCondLst>
+                                        </p:cTn>
+                                        <p:tgtEl>
+                                          <p:spTgt spid="9">
+                                            <p:txEl>
+                                              <p:pRg st="0" end="0"/>
+                                            </p:txEl>
+                                          </p:spTgt>
+                                        </p:tgtEl>
+                                        <p:attrNameLst>
+                                          <p:attrName>style.visibility</p:attrName>
+                                        </p:attrNameLst>
+                                      </p:cBhvr>
+                                      <p:to>
+                                        <p:strVal val="visible"/>
+                                      </p:to>
+                                    </p:set>
+                                    <p:animEffect transition="in" filter="dissolve">
+                                      <p:cBhvr>
+                                        <p:cTn id="12" dur="500"/>
+                                        <p:tgtEl>
+                                          <p:spTgt spid="9">
+                                            <p:txEl>
+                                              <p:pRg st="0" end="0"/>
+                                            </p:txEl>
+                                          </p:spTgt>
+                                        </p:tgtEl>
+                                      </p:cBhvr>
+                                    </p:animEffect>
+                                  </p:childTnLst>
+                                </p:cTn>
+                              </p:par>
+                            </p:childTnLst>
+                          </p:cTn>
+                        </p:par>
+                      </p:childTnLst>
+                    </p:cTn>
+                  </p:par>
+                  <p:par>
+                    <p:cTn id="13" fill="hold">
+                      <p:stCondLst>
+                        <p:cond delay="indefinite"/>
+                      </p:stCondLst>
+                      <p:childTnLst>
+                        <p:par>
+                          <p:cTn id="14" fill="hold">
+                            <p:stCondLst>
+                              <p:cond delay="0"/>
+                            </p:stCondLst>
+                            <p:childTnLst>
+                              <p:par>
+                                <p:cTn id="15" presetID="9" presetClass="entr" presetSubtype="0" fill="hold" nodeType="clickEffect">
+                                  <p:stCondLst>
+                                    <p:cond delay="0"/>
+                                  </p:stCondLst>
+                                  <p:childTnLst>
+                                    <p:set>
+                                      <p:cBhvr>
+                                        <p:cTn id="16" dur="1" fill="hold">
+                                          <p:stCondLst>
+                                            <p:cond delay="0"/>
+                                          </p:stCondLst>
+                                        </p:cTn>
+                                        <p:tgtEl>
+                                          <p:spTgt spid="10">
+                                            <p:txEl>
+                                              <p:pRg st="0" end="0"/>
+                                            </p:txEl>
+                                          </p:spTgt>
+                                        </p:tgtEl>
+                                        <p:attrNameLst>
+                                          <p:attrName>style.visibility</p:attrName>
+                                        </p:attrNameLst>
+                                      </p:cBhvr>
+                                      <p:to>
+                                        <p:strVal val="visible"/>
+                                      </p:to>
+                                    </p:set>
+                                    <p:animEffect transition="in" filter="dissolve">
+                                      <p:cBhvr>
+                                        <p:cTn id="17" dur="500"/>
+                                        <p:tgtEl>
+                                          <p:spTgt spid="10">
+                                            <p:txEl>
+                                              <p:pRg st="0" end="0"/>
+                                            </p:txEl>
+                                          </p:spTgt>
+                                        </p:tgtEl>
+                                      </p:cBhvr>
+                                    </p:animEffect>
+                                  </p:childTnLst>
+                                </p:cTn>
+                              </p:par>
+                            </p:childTnLst>
+                          </p:cTn>
+                        </p:par>
+                      </p:childTnLst>
+                    </p:cTn>
+                  </p:par>
+                  <p:par>
+                    <p:cTn id="18" fill="hold">
+                      <p:stCondLst>
+                        <p:cond delay="indefinite"/>
+                      </p:stCondLst>
+                      <p:childTnLst>
+                        <p:par>
+                          <p:cTn id="19" fill="hold">
+                            <p:stCondLst>
+                              <p:cond delay="0"/>
+                            </p:stCondLst>
+                            <p:childTnLst>
+                              <p:par>
+                                <p:cTn id="20" presetID="9" presetClass="entr" presetSubtype="0" fill="hold" nodeType="clickEffect">
+                                  <p:stCondLst>
+                                    <p:cond delay="0"/>
+                                  </p:stCondLst>
+                                  <p:childTnLst>
+                                    <p:set>
+                                      <p:cBhvr>
+                                        <p:cTn id="21" dur="1" fill="hold">
+                                          <p:stCondLst>
+                                            <p:cond delay="0"/>
+                                          </p:stCondLst>
+                                        </p:cTn>
+                                        <p:tgtEl>
+                                          <p:spTgt spid="11">
+                                            <p:txEl>
+                                              <p:pRg st="0" end="0"/>
+                                            </p:txEl>
+                                          </p:spTgt>
+                                        </p:tgtEl>
+                                        <p:attrNameLst>
+                                          <p:attrName>style.visibility</p:attrName>
+                                        </p:attrNameLst>
+                                      </p:cBhvr>
+                                      <p:to>
+                                        <p:strVal val="visible"/>
+                                      </p:to>
+                                    </p:set>
+                                    <p:animEffect transition="in" filter="dissolve">
+                                      <p:cBhvr>
+                                        <p:cTn id="22" dur="500"/>
+                                        <p:tgtEl>
+                                          <p:spTgt spid="11">
+                                            <p:txEl>
+                                              <p:pRg st="0" end="0"/>
+                                            </p:txEl>
+                                          </p:spTgt>
+                                        </p:tgtEl>
+                                      </p:cBhvr>
+                                    </p:animEffect>
+                                  </p:childTnLst>
+                                </p:cTn>
+                              </p:par>
+                            </p:childTnLst>
+                          </p:cTn>
+                        </p:par>
+                      </p:childTnLst>
+                    </p:cTn>
+                  </p:par>
+                </p:childTnLst>
+              </p:cTn>
+              <p:prevCondLst>
+                <p:cond evt="onPrev" delay="0">
+                  <p:tgtEl>
+                    <p:sldTgt/>
+                  </p:tgtEl>
+                </p:cond>
+              </p:prevCondLst>
+              <p:nextCondLst>
+                <p:cond evt="onNext" delay="0">
+                  <p:tgtEl>
+                    <p:sldTgt/>
+                  </p:tgtEl>
+                </p:cond>
+              </p:nextCondLst>
+            </p:seq>
+          </p:childTnLst>
+        </p:cTn>
+      </p:par>
+    </p:tnLst>
+    <p:bldLst>
+      <p:bldP spid="8" grpId="0"/>
+    </p:bldLst>
+  </p:timing>
 </p:sld>
 </file>
 
@@ -5129,7 +6858,7 @@
           <p:nvPr>
             <p:extLst>
               <p:ext uri="{D42A27DB-BD31-4B8C-83A1-F6EECF244321}">
-                <p14:modId xmlns:p14="http://schemas.microsoft.com/office/powerpoint/2010/main" val="1404812593"/>
+                <p14:modId xmlns:p14="http://schemas.microsoft.com/office/powerpoint/2010/main" val="1336005485"/>
               </p:ext>
             </p:extLst>
           </p:nvPr>
@@ -5667,6 +7396,89 @@
   <p:clrMapOvr>
     <a:masterClrMapping/>
   </p:clrMapOvr>
+  <p:timing>
+    <p:tnLst>
+      <p:par>
+        <p:cTn id="1" dur="indefinite" restart="never" nodeType="tmRoot">
+          <p:childTnLst>
+            <p:seq concurrent="1" nextAc="seek">
+              <p:cTn id="2" dur="indefinite" nodeType="mainSeq">
+                <p:childTnLst>
+                  <p:par>
+                    <p:cTn id="3" fill="hold">
+                      <p:stCondLst>
+                        <p:cond delay="indefinite"/>
+                      </p:stCondLst>
+                      <p:childTnLst>
+                        <p:par>
+                          <p:cTn id="4" fill="hold">
+                            <p:stCondLst>
+                              <p:cond delay="0"/>
+                            </p:stCondLst>
+                            <p:childTnLst>
+                              <p:par>
+                                <p:cTn id="5" presetID="3" presetClass="entr" presetSubtype="10" fill="hold" nodeType="clickEffect">
+                                  <p:stCondLst>
+                                    <p:cond delay="0"/>
+                                  </p:stCondLst>
+                                  <p:childTnLst>
+                                    <p:set>
+                                      <p:cBhvr>
+                                        <p:cTn id="6" dur="1" fill="hold">
+                                          <p:stCondLst>
+                                            <p:cond delay="0"/>
+                                          </p:stCondLst>
+                                        </p:cTn>
+                                        <p:tgtEl>
+                                          <p:spTgt spid="3"/>
+                                        </p:tgtEl>
+                                        <p:attrNameLst>
+                                          <p:attrName>style.visibility</p:attrName>
+                                        </p:attrNameLst>
+                                      </p:cBhvr>
+                                      <p:to>
+                                        <p:strVal val="visible"/>
+                                      </p:to>
+                                    </p:set>
+                                    <p:animEffect transition="in" filter="blinds(horizontal)">
+                                      <p:cBhvr>
+                                        <p:cTn id="7" dur="1000"/>
+                                        <p:tgtEl>
+                                          <p:spTgt spid="3"/>
+                                        </p:tgtEl>
+                                      </p:cBhvr>
+                                    </p:animEffect>
+                                  </p:childTnLst>
+                                </p:cTn>
+                              </p:par>
+                            </p:childTnLst>
+                          </p:cTn>
+                        </p:par>
+                      </p:childTnLst>
+                    </p:cTn>
+                  </p:par>
+                </p:childTnLst>
+              </p:cTn>
+              <p:prevCondLst>
+                <p:cond evt="onPrev" delay="0">
+                  <p:tgtEl>
+                    <p:sldTgt/>
+                  </p:tgtEl>
+                </p:cond>
+              </p:prevCondLst>
+              <p:nextCondLst>
+                <p:cond evt="onNext" delay="0">
+                  <p:tgtEl>
+                    <p:sldTgt/>
+                  </p:tgtEl>
+                </p:cond>
+              </p:nextCondLst>
+            </p:seq>
+          </p:childTnLst>
+        </p:cTn>
+      </p:par>
+    </p:tnLst>
+  </p:timing>
 </p:sld>
 </file>
 
@@ -5862,6 +7674,219 @@
   <p:clrMapOvr>
     <a:masterClrMapping/>
   </p:clrMapOvr>
+  <p:timing>
+    <p:tnLst>
+      <p:par>
+        <p:cTn id="1" dur="indefinite" restart="never" nodeType="tmRoot">
+          <p:childTnLst>
+            <p:seq concurrent="1" nextAc="seek">
+              <p:cTn id="2" dur="indefinite" nodeType="mainSeq">
+                <p:childTnLst>
+                  <p:par>
+                    <p:cTn id="3" fill="hold">
+                      <p:stCondLst>
+                        <p:cond delay="indefinite"/>
+                      </p:stCondLst>
+                      <p:childTnLst>
+                        <p:par>
+                          <p:cTn id="4" fill="hold">
+                            <p:stCondLst>
+                              <p:cond delay="0"/>
+                            </p:stCondLst>
+                            <p:childTnLst>
+                              <p:par>
+                                <p:cTn id="5" presetID="9" presetClass="entr" presetSubtype="0" fill="hold" nodeType="clickEffect">
+                                  <p:stCondLst>
+                                    <p:cond delay="0"/>
+                                  </p:stCondLst>
+                                  <p:childTnLst>
+                                    <p:set>
+                                      <p:cBhvr>
+                                        <p:cTn id="6" dur="1" fill="hold">
+                                          <p:stCondLst>
+                                            <p:cond delay="0"/>
+                                          </p:stCondLst>
+                                        </p:cTn>
+                                        <p:tgtEl>
+                                          <p:spTgt spid="4">
+                                            <p:txEl>
+                                              <p:pRg st="0" end="0"/>
+                                            </p:txEl>
+                                          </p:spTgt>
+                                        </p:tgtEl>
+                                        <p:attrNameLst>
+                                          <p:attrName>style.visibility</p:attrName>
+                                        </p:attrNameLst>
+                                      </p:cBhvr>
+                                      <p:to>
+                                        <p:strVal val="visible"/>
+                                      </p:to>
+                                    </p:set>
+                                    <p:animEffect transition="in" filter="dissolve">
+                                      <p:cBhvr>
+                                        <p:cTn id="7" dur="500"/>
+                                        <p:tgtEl>
+                                          <p:spTgt spid="4">
+                                            <p:txEl>
+                                              <p:pRg st="0" end="0"/>
+                                            </p:txEl>
+                                          </p:spTgt>
+                                        </p:tgtEl>
+                                      </p:cBhvr>
+                                    </p:animEffect>
+                                  </p:childTnLst>
+                                </p:cTn>
+                              </p:par>
+                            </p:childTnLst>
+                          </p:cTn>
+                        </p:par>
+                      </p:childTnLst>
+                    </p:cTn>
+                  </p:par>
+                  <p:par>
+                    <p:cTn id="8" fill="hold">
+                      <p:stCondLst>
+                        <p:cond delay="indefinite"/>
+                      </p:stCondLst>
+                      <p:childTnLst>
+                        <p:par>
+                          <p:cTn id="9" fill="hold">
+                            <p:stCondLst>
+                              <p:cond delay="0"/>
+                            </p:stCondLst>
+                            <p:childTnLst>
+                              <p:par>
+                                <p:cTn id="10" presetID="9" presetClass="entr" presetSubtype="0" fill="hold" nodeType="clickEffect">
+                                  <p:stCondLst>
+                                    <p:cond delay="0"/>
+                                  </p:stCondLst>
+                                  <p:childTnLst>
+                                    <p:set>
+                                      <p:cBhvr>
+                                        <p:cTn id="11" dur="1" fill="hold">
+                                          <p:stCondLst>
+                                            <p:cond delay="0"/>
+                                          </p:stCondLst>
+                                        </p:cTn>
+                                        <p:tgtEl>
+                                          <p:spTgt spid="5">
+                                            <p:txEl>
+                                              <p:pRg st="0" end="0"/>
+                                            </p:txEl>
+                                          </p:spTgt>
+                                        </p:tgtEl>
+                                        <p:attrNameLst>
+                                          <p:attrName>style.visibility</p:attrName>
+                                        </p:attrNameLst>
+                                      </p:cBhvr>
+                                      <p:to>
+                                        <p:strVal val="visible"/>
+                                      </p:to>
+                                    </p:set>
+                                    <p:animEffect transition="in" filter="dissolve">
+                                      <p:cBhvr>
+                                        <p:cTn id="12" dur="500"/>
+                                        <p:tgtEl>
+                                          <p:spTgt spid="5">
+                                            <p:txEl>
+                                              <p:pRg st="0" end="0"/>
+                                            </p:txEl>
+                                          </p:spTgt>
+                                        </p:tgtEl>
+                                      </p:cBhvr>
+                                    </p:animEffect>
+                                  </p:childTnLst>
+                                </p:cTn>
+                              </p:par>
+                            </p:childTnLst>
+                          </p:cTn>
+                        </p:par>
+                      </p:childTnLst>
+                    </p:cTn>
+                  </p:par>
+                  <p:par>
+                    <p:cTn id="13" fill="hold">
+                      <p:stCondLst>
+                        <p:cond delay="indefinite"/>
+                      </p:stCondLst>
+                      <p:childTnLst>
+                        <p:par>
+                          <p:cTn id="14" fill="hold">
+                            <p:stCondLst>
+                              <p:cond delay="0"/>
+                            </p:stCondLst>
+                            <p:childTnLst>
+                              <p:par>
+                                <p:cTn id="15" presetID="9" presetClass="entr" presetSubtype="0" fill="hold" nodeType="clickEffect">
+                                  <p:stCondLst>
+                                    <p:cond delay="0"/>
+                                  </p:stCondLst>
+                                  <p:childTnLst>
+                                    <p:set>
+                                      <p:cBhvr>
+                                        <p:cTn id="16" dur="1" fill="hold">
+                                          <p:stCondLst>
+                                            <p:cond delay="0"/>
+                                          </p:stCondLst>
+                                        </p:cTn>
+                                        <p:tgtEl>
+                                          <p:spTgt spid="6">
+                                            <p:txEl>
+                                              <p:pRg st="0" end="0"/>
+                                            </p:txEl>
+                                          </p:spTgt>
+                                        </p:tgtEl>
+                                        <p:attrNameLst>
+                                          <p:attrName>style.visibility</p:attrName>
+                                        </p:attrNameLst>
+                                      </p:cBhvr>
+                                      <p:to>
+                                        <p:strVal val="visible"/>
+                                      </p:to>
+                                    </p:set>
+                                    <p:animEffect transition="in" filter="dissolve">
+                                      <p:cBhvr>
+                                        <p:cTn id="17" dur="500"/>
+                                        <p:tgtEl>
+                                          <p:spTgt spid="6">
+                                            <p:txEl>
+                                              <p:pRg st="0" end="0"/>
+                                            </p:txEl>
+                                          </p:spTgt>
+                                        </p:tgtEl>
+                                      </p:cBhvr>
+                                    </p:animEffect>
+                                  </p:childTnLst>
+                                </p:cTn>
+                              </p:par>
+                            </p:childTnLst>
+                          </p:cTn>
+                        </p:par>
+                      </p:childTnLst>
+                    </p:cTn>
+                  </p:par>
+                </p:childTnLst>
+              </p:cTn>
+              <p:prevCondLst>
+                <p:cond evt="onPrev" delay="0">
+                  <p:tgtEl>
+                    <p:sldTgt/>
+                  </p:tgtEl>
+                </p:cond>
+              </p:prevCondLst>
+              <p:nextCondLst>
+                <p:cond evt="onNext" delay="0">
+                  <p:tgtEl>
+                    <p:sldTgt/>
+                  </p:tgtEl>
+                </p:cond>
+              </p:nextCondLst>
+            </p:seq>
+          </p:childTnLst>
+        </p:cTn>
+      </p:par>
+    </p:tnLst>
+  </p:timing>
 </p:sld>
 </file>
 

</xml_diff>

<commit_message>
presentation changes post review
</commit_message>
<xml_diff>
--- a/presentation.pptx
+++ b/presentation.pptx
@@ -5995,7 +5995,7 @@
         </p:blipFill>
         <p:spPr bwMode="auto">
           <a:xfrm>
-            <a:off x="3860800" y="1110328"/>
+            <a:off x="4522949" y="1110328"/>
             <a:ext cx="2479040" cy="2479040"/>
           </a:xfrm>
           <a:prstGeom prst="rect">
@@ -6027,7 +6027,7 @@
         </p:nvSpPr>
         <p:spPr>
           <a:xfrm>
-            <a:off x="3714750" y="1986340"/>
+            <a:off x="2516578" y="1986340"/>
             <a:ext cx="7378700" cy="584775"/>
           </a:xfrm>
           <a:prstGeom prst="rect">
@@ -6049,7 +6049,7 @@
               <a:rPr lang="en-US" sz="3200" dirty="0">
                 <a:latin typeface="Garamond" panose="02020404030301010803" pitchFamily="18" charset="0"/>
               </a:rPr>
-              <a:t>   </a:t>
+              <a:t>content:        </a:t>
             </a:r>
             <a:r>
               <a:rPr lang="en-US" sz="3200" b="1" dirty="0">
@@ -6108,7 +6108,7 @@
         </p:nvSpPr>
         <p:spPr>
           <a:xfrm>
-            <a:off x="3714750" y="3717458"/>
+            <a:off x="2516578" y="3717458"/>
             <a:ext cx="7378700" cy="584775"/>
           </a:xfrm>
           <a:prstGeom prst="rect">
@@ -6130,7 +6130,7 @@
               <a:rPr lang="en-US" sz="3200" dirty="0">
                 <a:latin typeface="Garamond" panose="02020404030301010803" pitchFamily="18" charset="0"/>
               </a:rPr>
-              <a:t> </a:t>
+              <a:t>sentiment:</a:t>
             </a:r>
           </a:p>
         </p:txBody>
@@ -6149,7 +6149,7 @@
         </p:nvSpPr>
         <p:spPr>
           <a:xfrm>
-            <a:off x="3714750" y="5342127"/>
+            <a:off x="2516578" y="5342127"/>
             <a:ext cx="8807450" cy="584775"/>
           </a:xfrm>
           <a:prstGeom prst="rect">
@@ -6171,7 +6171,7 @@
               <a:rPr lang="en-US" sz="3200" dirty="0">
                 <a:latin typeface="Garamond" panose="02020404030301010803" pitchFamily="18" charset="0"/>
               </a:rPr>
-              <a:t> </a:t>
+              <a:t>brand:</a:t>
             </a:r>
           </a:p>
         </p:txBody>
@@ -6203,7 +6203,7 @@
         </p:blipFill>
         <p:spPr bwMode="auto">
           <a:xfrm>
-            <a:off x="4305300" y="3348016"/>
+            <a:off x="4967449" y="3348016"/>
             <a:ext cx="3708400" cy="1270498"/>
           </a:xfrm>
           <a:prstGeom prst="rect">
@@ -6250,7 +6250,7 @@
         </p:blipFill>
         <p:spPr bwMode="auto">
           <a:xfrm>
-            <a:off x="4305300" y="4920139"/>
+            <a:off x="4967449" y="4920139"/>
             <a:ext cx="1162050" cy="1428750"/>
           </a:xfrm>
           <a:prstGeom prst="rect">
@@ -6297,7 +6297,7 @@
         </p:blipFill>
         <p:spPr bwMode="auto">
           <a:xfrm>
-            <a:off x="6229350" y="4936203"/>
+            <a:off x="6891499" y="4936203"/>
             <a:ext cx="1524000" cy="1524000"/>
           </a:xfrm>
           <a:prstGeom prst="rect">
@@ -7000,14 +7000,51 @@
         </p:blipFill>
         <p:spPr>
           <a:xfrm>
-            <a:off x="2837053" y="1690688"/>
-            <a:ext cx="6517894" cy="4416171"/>
+            <a:off x="3663950" y="1690688"/>
+            <a:ext cx="4864100" cy="3295650"/>
           </a:xfrm>
           <a:prstGeom prst="rect">
             <a:avLst/>
           </a:prstGeom>
         </p:spPr>
       </p:pic>
+      <p:sp>
+        <p:nvSpPr>
+          <p:cNvPr id="3" name="TextBox 2">
+            <a:extLst>
+              <a:ext uri="{FF2B5EF4-FFF2-40B4-BE49-F238E27FC236}">
+                <a16:creationId xmlns:a16="http://schemas.microsoft.com/office/drawing/2014/main" id="{6C40102C-51FC-8D55-6BEA-6C7C2C81E3AF}"/>
+              </a:ext>
+            </a:extLst>
+          </p:cNvPr>
+          <p:cNvSpPr txBox="1"/>
+          <p:nvPr/>
+        </p:nvSpPr>
+        <p:spPr>
+          <a:xfrm>
+            <a:off x="2406649" y="5302639"/>
+            <a:ext cx="7737475" cy="584775"/>
+          </a:xfrm>
+          <a:prstGeom prst="rect">
+            <a:avLst/>
+          </a:prstGeom>
+          <a:noFill/>
+        </p:spPr>
+        <p:txBody>
+          <a:bodyPr wrap="square" rtlCol="0">
+            <a:spAutoFit/>
+          </a:bodyPr>
+          <a:lstStyle/>
+          <a:p>
+            <a:r>
+              <a:rPr lang="en-US" sz="3200" dirty="0">
+                <a:latin typeface="Garamond" panose="02020404030301010803" pitchFamily="18" charset="0"/>
+              </a:rPr>
+              <a:t>more tweets about Apple than Google by 2 : 1</a:t>
+            </a:r>
+          </a:p>
+        </p:txBody>
+      </p:sp>
     </p:spTree>
     <p:extLst>
       <p:ext uri="{BB962C8B-B14F-4D97-AF65-F5344CB8AC3E}">
@@ -7018,6 +7055,92 @@
   <p:clrMapOvr>
     <a:masterClrMapping/>
   </p:clrMapOvr>
+  <p:timing>
+    <p:tnLst>
+      <p:par>
+        <p:cTn id="1" dur="indefinite" restart="never" nodeType="tmRoot">
+          <p:childTnLst>
+            <p:seq concurrent="1" nextAc="seek">
+              <p:cTn id="2" dur="indefinite" nodeType="mainSeq">
+                <p:childTnLst>
+                  <p:par>
+                    <p:cTn id="3" fill="hold">
+                      <p:stCondLst>
+                        <p:cond delay="indefinite"/>
+                      </p:stCondLst>
+                      <p:childTnLst>
+                        <p:par>
+                          <p:cTn id="4" fill="hold">
+                            <p:stCondLst>
+                              <p:cond delay="0"/>
+                            </p:stCondLst>
+                            <p:childTnLst>
+                              <p:par>
+                                <p:cTn id="5" presetID="9" presetClass="entr" presetSubtype="0" fill="hold" grpId="0" nodeType="clickEffect">
+                                  <p:stCondLst>
+                                    <p:cond delay="0"/>
+                                  </p:stCondLst>
+                                  <p:childTnLst>
+                                    <p:set>
+                                      <p:cBhvr>
+                                        <p:cTn id="6" dur="1" fill="hold">
+                                          <p:stCondLst>
+                                            <p:cond delay="0"/>
+                                          </p:stCondLst>
+                                        </p:cTn>
+                                        <p:tgtEl>
+                                          <p:spTgt spid="3"/>
+                                        </p:tgtEl>
+                                        <p:attrNameLst>
+                                          <p:attrName>style.visibility</p:attrName>
+                                        </p:attrNameLst>
+                                      </p:cBhvr>
+                                      <p:to>
+                                        <p:strVal val="visible"/>
+                                      </p:to>
+                                    </p:set>
+                                    <p:animEffect transition="in" filter="dissolve">
+                                      <p:cBhvr>
+                                        <p:cTn id="7" dur="500"/>
+                                        <p:tgtEl>
+                                          <p:spTgt spid="3"/>
+                                        </p:tgtEl>
+                                      </p:cBhvr>
+                                    </p:animEffect>
+                                  </p:childTnLst>
+                                </p:cTn>
+                              </p:par>
+                            </p:childTnLst>
+                          </p:cTn>
+                        </p:par>
+                      </p:childTnLst>
+                    </p:cTn>
+                  </p:par>
+                </p:childTnLst>
+              </p:cTn>
+              <p:prevCondLst>
+                <p:cond evt="onPrev" delay="0">
+                  <p:tgtEl>
+                    <p:sldTgt/>
+                  </p:tgtEl>
+                </p:cond>
+              </p:prevCondLst>
+              <p:nextCondLst>
+                <p:cond evt="onNext" delay="0">
+                  <p:tgtEl>
+                    <p:sldTgt/>
+                  </p:tgtEl>
+                </p:cond>
+              </p:nextCondLst>
+            </p:seq>
+          </p:childTnLst>
+        </p:cTn>
+      </p:par>
+    </p:tnLst>
+    <p:bldLst>
+      <p:bldP spid="3" grpId="0"/>
+    </p:bldLst>
+  </p:timing>
 </p:sld>
 </file>
 
@@ -7093,14 +7216,51 @@
         </p:blipFill>
         <p:spPr>
           <a:xfrm>
-            <a:off x="2837053" y="1690688"/>
-            <a:ext cx="6517894" cy="4416171"/>
+            <a:off x="3663950" y="1690688"/>
+            <a:ext cx="4864100" cy="3295650"/>
           </a:xfrm>
           <a:prstGeom prst="rect">
             <a:avLst/>
           </a:prstGeom>
         </p:spPr>
       </p:pic>
+      <p:sp>
+        <p:nvSpPr>
+          <p:cNvPr id="4" name="TextBox 3">
+            <a:extLst>
+              <a:ext uri="{FF2B5EF4-FFF2-40B4-BE49-F238E27FC236}">
+                <a16:creationId xmlns:a16="http://schemas.microsoft.com/office/drawing/2014/main" id="{4E1C6059-5315-49C4-8732-4E9D3A81680D}"/>
+              </a:ext>
+            </a:extLst>
+          </p:cNvPr>
+          <p:cNvSpPr txBox="1"/>
+          <p:nvPr/>
+        </p:nvSpPr>
+        <p:spPr>
+          <a:xfrm>
+            <a:off x="2406649" y="5302639"/>
+            <a:ext cx="7737475" cy="1077218"/>
+          </a:xfrm>
+          <a:prstGeom prst="rect">
+            <a:avLst/>
+          </a:prstGeom>
+          <a:noFill/>
+        </p:spPr>
+        <p:txBody>
+          <a:bodyPr wrap="square" rtlCol="0">
+            <a:spAutoFit/>
+          </a:bodyPr>
+          <a:lstStyle/>
+          <a:p>
+            <a:r>
+              <a:rPr lang="en-US" sz="3200" dirty="0">
+                <a:latin typeface="Garamond" panose="02020404030301010803" pitchFamily="18" charset="0"/>
+              </a:rPr>
+              <a:t>both Apple and Google had (+) : (–) ratio of about 5 : 1</a:t>
+            </a:r>
+          </a:p>
+        </p:txBody>
+      </p:sp>
     </p:spTree>
     <p:extLst>
       <p:ext uri="{BB962C8B-B14F-4D97-AF65-F5344CB8AC3E}">
@@ -7111,6 +7271,92 @@
   <p:clrMapOvr>
     <a:masterClrMapping/>
   </p:clrMapOvr>
+  <p:timing>
+    <p:tnLst>
+      <p:par>
+        <p:cTn id="1" dur="indefinite" restart="never" nodeType="tmRoot">
+          <p:childTnLst>
+            <p:seq concurrent="1" nextAc="seek">
+              <p:cTn id="2" dur="indefinite" nodeType="mainSeq">
+                <p:childTnLst>
+                  <p:par>
+                    <p:cTn id="3" fill="hold">
+                      <p:stCondLst>
+                        <p:cond delay="indefinite"/>
+                      </p:stCondLst>
+                      <p:childTnLst>
+                        <p:par>
+                          <p:cTn id="4" fill="hold">
+                            <p:stCondLst>
+                              <p:cond delay="0"/>
+                            </p:stCondLst>
+                            <p:childTnLst>
+                              <p:par>
+                                <p:cTn id="5" presetID="9" presetClass="entr" presetSubtype="0" fill="hold" grpId="0" nodeType="clickEffect">
+                                  <p:stCondLst>
+                                    <p:cond delay="0"/>
+                                  </p:stCondLst>
+                                  <p:childTnLst>
+                                    <p:set>
+                                      <p:cBhvr>
+                                        <p:cTn id="6" dur="1" fill="hold">
+                                          <p:stCondLst>
+                                            <p:cond delay="0"/>
+                                          </p:stCondLst>
+                                        </p:cTn>
+                                        <p:tgtEl>
+                                          <p:spTgt spid="4"/>
+                                        </p:tgtEl>
+                                        <p:attrNameLst>
+                                          <p:attrName>style.visibility</p:attrName>
+                                        </p:attrNameLst>
+                                      </p:cBhvr>
+                                      <p:to>
+                                        <p:strVal val="visible"/>
+                                      </p:to>
+                                    </p:set>
+                                    <p:animEffect transition="in" filter="dissolve">
+                                      <p:cBhvr>
+                                        <p:cTn id="7" dur="500"/>
+                                        <p:tgtEl>
+                                          <p:spTgt spid="4"/>
+                                        </p:tgtEl>
+                                      </p:cBhvr>
+                                    </p:animEffect>
+                                  </p:childTnLst>
+                                </p:cTn>
+                              </p:par>
+                            </p:childTnLst>
+                          </p:cTn>
+                        </p:par>
+                      </p:childTnLst>
+                    </p:cTn>
+                  </p:par>
+                </p:childTnLst>
+              </p:cTn>
+              <p:prevCondLst>
+                <p:cond evt="onPrev" delay="0">
+                  <p:tgtEl>
+                    <p:sldTgt/>
+                  </p:tgtEl>
+                </p:cond>
+              </p:prevCondLst>
+              <p:nextCondLst>
+                <p:cond evt="onNext" delay="0">
+                  <p:tgtEl>
+                    <p:sldTgt/>
+                  </p:tgtEl>
+                </p:cond>
+              </p:nextCondLst>
+            </p:seq>
+          </p:childTnLst>
+        </p:cTn>
+      </p:par>
+    </p:tnLst>
+    <p:bldLst>
+      <p:bldP spid="4" grpId="0"/>
+    </p:bldLst>
+  </p:timing>
 </p:sld>
 </file>
 
@@ -7193,7 +7439,7 @@
         </p:blipFill>
         <p:spPr bwMode="auto">
           <a:xfrm>
-            <a:off x="993140" y="1952628"/>
+            <a:off x="993140" y="1609716"/>
             <a:ext cx="10205720" cy="3427095"/>
           </a:xfrm>
           <a:prstGeom prst="rect">
@@ -7211,6 +7457,98 @@
           </a:extLst>
         </p:spPr>
       </p:pic>
+      <p:sp>
+        <p:nvSpPr>
+          <p:cNvPr id="3" name="TextBox 2">
+            <a:extLst>
+              <a:ext uri="{FF2B5EF4-FFF2-40B4-BE49-F238E27FC236}">
+                <a16:creationId xmlns:a16="http://schemas.microsoft.com/office/drawing/2014/main" id="{4E9AFFD2-5594-8BA3-ED03-46FA218C8149}"/>
+              </a:ext>
+            </a:extLst>
+          </p:cNvPr>
+          <p:cNvSpPr txBox="1"/>
+          <p:nvPr/>
+        </p:nvSpPr>
+        <p:spPr>
+          <a:xfrm>
+            <a:off x="993141" y="5248284"/>
+            <a:ext cx="5102860" cy="1077218"/>
+          </a:xfrm>
+          <a:prstGeom prst="rect">
+            <a:avLst/>
+          </a:prstGeom>
+          <a:noFill/>
+        </p:spPr>
+        <p:txBody>
+          <a:bodyPr wrap="square" rtlCol="0">
+            <a:spAutoFit/>
+          </a:bodyPr>
+          <a:lstStyle/>
+          <a:p>
+            <a:r>
+              <a:rPr lang="en-US" sz="3200" dirty="0">
+                <a:latin typeface="Garamond" panose="02020404030301010803" pitchFamily="18" charset="0"/>
+              </a:rPr>
+              <a:t>(+): “</a:t>
+            </a:r>
+            <a:r>
+              <a:rPr lang="en-US" sz="3200" i="1" dirty="0">
+                <a:latin typeface="Garamond" panose="02020404030301010803" pitchFamily="18" charset="0"/>
+              </a:rPr>
+              <a:t>temporary store”, “popup store”, “downtown Austin”</a:t>
+            </a:r>
+            <a:endParaRPr lang="en-US" sz="3200" dirty="0">
+              <a:latin typeface="Garamond" panose="02020404030301010803" pitchFamily="18" charset="0"/>
+            </a:endParaRPr>
+          </a:p>
+        </p:txBody>
+      </p:sp>
+      <p:sp>
+        <p:nvSpPr>
+          <p:cNvPr id="4" name="TextBox 3">
+            <a:extLst>
+              <a:ext uri="{FF2B5EF4-FFF2-40B4-BE49-F238E27FC236}">
+                <a16:creationId xmlns:a16="http://schemas.microsoft.com/office/drawing/2014/main" id="{10BC2B84-8988-DA7E-7D93-1953E4CF410E}"/>
+              </a:ext>
+            </a:extLst>
+          </p:cNvPr>
+          <p:cNvSpPr txBox="1"/>
+          <p:nvPr/>
+        </p:nvSpPr>
+        <p:spPr>
+          <a:xfrm>
+            <a:off x="6096000" y="5248284"/>
+            <a:ext cx="5102860" cy="1077218"/>
+          </a:xfrm>
+          <a:prstGeom prst="rect">
+            <a:avLst/>
+          </a:prstGeom>
+          <a:noFill/>
+        </p:spPr>
+        <p:txBody>
+          <a:bodyPr wrap="square" rtlCol="0">
+            <a:spAutoFit/>
+          </a:bodyPr>
+          <a:lstStyle/>
+          <a:p>
+            <a:r>
+              <a:rPr lang="en-US" sz="3200" dirty="0">
+                <a:latin typeface="Garamond" panose="02020404030301010803" pitchFamily="18" charset="0"/>
+              </a:rPr>
+              <a:t>(–): “</a:t>
+            </a:r>
+            <a:r>
+              <a:rPr lang="en-US" sz="3200" i="1" dirty="0">
+                <a:latin typeface="Garamond" panose="02020404030301010803" pitchFamily="18" charset="0"/>
+              </a:rPr>
+              <a:t>battery”, “design headache”, “fascist company”</a:t>
+            </a:r>
+            <a:endParaRPr lang="en-US" sz="3200" dirty="0">
+              <a:latin typeface="Garamond" panose="02020404030301010803" pitchFamily="18" charset="0"/>
+            </a:endParaRPr>
+          </a:p>
+        </p:txBody>
+      </p:sp>
     </p:spTree>
     <p:extLst>
       <p:ext uri="{BB962C8B-B14F-4D97-AF65-F5344CB8AC3E}">
@@ -7323,6 +7661,112 @@
                       </p:childTnLst>
                     </p:cTn>
                   </p:par>
+                  <p:par>
+                    <p:cTn id="9" fill="hold">
+                      <p:stCondLst>
+                        <p:cond delay="indefinite"/>
+                      </p:stCondLst>
+                      <p:childTnLst>
+                        <p:par>
+                          <p:cTn id="10" fill="hold">
+                            <p:stCondLst>
+                              <p:cond delay="0"/>
+                            </p:stCondLst>
+                            <p:childTnLst>
+                              <p:par>
+                                <p:cTn id="11" presetID="9" presetClass="entr" presetSubtype="0" fill="hold" grpId="0" nodeType="clickEffect">
+                                  <p:stCondLst>
+                                    <p:cond delay="0"/>
+                                  </p:stCondLst>
+                                  <p:childTnLst>
+                                    <p:set>
+                                      <p:cBhvr>
+                                        <p:cTn id="12" dur="1" fill="hold">
+                                          <p:stCondLst>
+                                            <p:cond delay="0"/>
+                                          </p:stCondLst>
+                                        </p:cTn>
+                                        <p:tgtEl>
+                                          <p:spTgt spid="3"/>
+                                        </p:tgtEl>
+                                        <p:attrNameLst>
+                                          <p:attrName>style.visibility</p:attrName>
+                                        </p:attrNameLst>
+                                      </p:cBhvr>
+                                      <p:to>
+                                        <p:strVal val="visible"/>
+                                      </p:to>
+                                    </p:set>
+                                    <p:animEffect transition="in" filter="dissolve">
+                                      <p:cBhvr>
+                                        <p:cTn id="13" dur="500"/>
+                                        <p:tgtEl>
+                                          <p:spTgt spid="3"/>
+                                        </p:tgtEl>
+                                      </p:cBhvr>
+                                    </p:animEffect>
+                                  </p:childTnLst>
+                                </p:cTn>
+                              </p:par>
+                            </p:childTnLst>
+                          </p:cTn>
+                        </p:par>
+                      </p:childTnLst>
+                    </p:cTn>
+                  </p:par>
+                  <p:par>
+                    <p:cTn id="14" fill="hold">
+                      <p:stCondLst>
+                        <p:cond delay="indefinite"/>
+                      </p:stCondLst>
+                      <p:childTnLst>
+                        <p:par>
+                          <p:cTn id="15" fill="hold">
+                            <p:stCondLst>
+                              <p:cond delay="0"/>
+                            </p:stCondLst>
+                            <p:childTnLst>
+                              <p:par>
+                                <p:cTn id="16" presetID="9" presetClass="entr" presetSubtype="0" fill="hold" grpId="0" nodeType="clickEffect">
+                                  <p:stCondLst>
+                                    <p:cond delay="0"/>
+                                  </p:stCondLst>
+                                  <p:childTnLst>
+                                    <p:set>
+                                      <p:cBhvr>
+                                        <p:cTn id="17" dur="1" fill="hold">
+                                          <p:stCondLst>
+                                            <p:cond delay="0"/>
+                                          </p:stCondLst>
+                                        </p:cTn>
+                                        <p:tgtEl>
+                                          <p:spTgt spid="4"/>
+                                        </p:tgtEl>
+                                        <p:attrNameLst>
+                                          <p:attrName>style.visibility</p:attrName>
+                                        </p:attrNameLst>
+                                      </p:cBhvr>
+                                      <p:to>
+                                        <p:strVal val="visible"/>
+                                      </p:to>
+                                    </p:set>
+                                    <p:animEffect transition="in" filter="dissolve">
+                                      <p:cBhvr>
+                                        <p:cTn id="18" dur="500"/>
+                                        <p:tgtEl>
+                                          <p:spTgt spid="4"/>
+                                        </p:tgtEl>
+                                      </p:cBhvr>
+                                    </p:animEffect>
+                                  </p:childTnLst>
+                                </p:cTn>
+                              </p:par>
+                            </p:childTnLst>
+                          </p:cTn>
+                        </p:par>
+                      </p:childTnLst>
+                    </p:cTn>
+                  </p:par>
                 </p:childTnLst>
               </p:cTn>
               <p:prevCondLst>
@@ -7344,6 +7788,10 @@
         </p:cTn>
       </p:par>
     </p:tnLst>
+    <p:bldLst>
+      <p:bldP spid="3" grpId="0"/>
+      <p:bldP spid="4" grpId="0"/>
+    </p:bldLst>
   </p:timing>
 </p:sld>
 </file>
@@ -7427,7 +7875,7 @@
         </p:blipFill>
         <p:spPr bwMode="auto">
           <a:xfrm>
-            <a:off x="996696" y="1956816"/>
+            <a:off x="996696" y="1628192"/>
             <a:ext cx="10205720" cy="3427095"/>
           </a:xfrm>
           <a:prstGeom prst="rect">
@@ -7445,6 +7893,98 @@
           </a:extLst>
         </p:spPr>
       </p:pic>
+      <p:sp>
+        <p:nvSpPr>
+          <p:cNvPr id="3" name="TextBox 2">
+            <a:extLst>
+              <a:ext uri="{FF2B5EF4-FFF2-40B4-BE49-F238E27FC236}">
+                <a16:creationId xmlns:a16="http://schemas.microsoft.com/office/drawing/2014/main" id="{E3F51510-74A2-D299-EA08-61D76B8E426E}"/>
+              </a:ext>
+            </a:extLst>
+          </p:cNvPr>
+          <p:cNvSpPr txBox="1"/>
+          <p:nvPr/>
+        </p:nvSpPr>
+        <p:spPr>
+          <a:xfrm>
+            <a:off x="993141" y="5248284"/>
+            <a:ext cx="5102860" cy="584775"/>
+          </a:xfrm>
+          <a:prstGeom prst="rect">
+            <a:avLst/>
+          </a:prstGeom>
+          <a:noFill/>
+        </p:spPr>
+        <p:txBody>
+          <a:bodyPr wrap="square" rtlCol="0">
+            <a:spAutoFit/>
+          </a:bodyPr>
+          <a:lstStyle/>
+          <a:p>
+            <a:r>
+              <a:rPr lang="en-US" sz="3200" dirty="0">
+                <a:latin typeface="Garamond" panose="02020404030301010803" pitchFamily="18" charset="0"/>
+              </a:rPr>
+              <a:t>(+): “</a:t>
+            </a:r>
+            <a:r>
+              <a:rPr lang="en-US" sz="3200" i="1" dirty="0">
+                <a:latin typeface="Garamond" panose="02020404030301010803" pitchFamily="18" charset="0"/>
+              </a:rPr>
+              <a:t>party”, “maps”</a:t>
+            </a:r>
+            <a:endParaRPr lang="en-US" sz="3200" dirty="0">
+              <a:latin typeface="Garamond" panose="02020404030301010803" pitchFamily="18" charset="0"/>
+            </a:endParaRPr>
+          </a:p>
+        </p:txBody>
+      </p:sp>
+      <p:sp>
+        <p:nvSpPr>
+          <p:cNvPr id="4" name="TextBox 3">
+            <a:extLst>
+              <a:ext uri="{FF2B5EF4-FFF2-40B4-BE49-F238E27FC236}">
+                <a16:creationId xmlns:a16="http://schemas.microsoft.com/office/drawing/2014/main" id="{D0071BE4-6B55-4B09-3836-9506316C4BA1}"/>
+              </a:ext>
+            </a:extLst>
+          </p:cNvPr>
+          <p:cNvSpPr txBox="1"/>
+          <p:nvPr/>
+        </p:nvSpPr>
+        <p:spPr>
+          <a:xfrm>
+            <a:off x="6096000" y="5248284"/>
+            <a:ext cx="5102860" cy="584775"/>
+          </a:xfrm>
+          <a:prstGeom prst="rect">
+            <a:avLst/>
+          </a:prstGeom>
+          <a:noFill/>
+        </p:spPr>
+        <p:txBody>
+          <a:bodyPr wrap="square" rtlCol="0">
+            <a:spAutoFit/>
+          </a:bodyPr>
+          <a:lstStyle/>
+          <a:p>
+            <a:r>
+              <a:rPr lang="en-US" sz="3200" dirty="0">
+                <a:latin typeface="Garamond" panose="02020404030301010803" pitchFamily="18" charset="0"/>
+              </a:rPr>
+              <a:t>(–): “</a:t>
+            </a:r>
+            <a:r>
+              <a:rPr lang="en-US" sz="3200" i="1" dirty="0">
+                <a:latin typeface="Garamond" panose="02020404030301010803" pitchFamily="18" charset="0"/>
+              </a:rPr>
+              <a:t>circles”, “Bing”, “launching”</a:t>
+            </a:r>
+            <a:endParaRPr lang="en-US" sz="3200" dirty="0">
+              <a:latin typeface="Garamond" panose="02020404030301010803" pitchFamily="18" charset="0"/>
+            </a:endParaRPr>
+          </a:p>
+        </p:txBody>
+      </p:sp>
     </p:spTree>
     <p:extLst>
       <p:ext uri="{BB962C8B-B14F-4D97-AF65-F5344CB8AC3E}">
@@ -7557,6 +8097,112 @@
                       </p:childTnLst>
                     </p:cTn>
                   </p:par>
+                  <p:par>
+                    <p:cTn id="9" fill="hold">
+                      <p:stCondLst>
+                        <p:cond delay="indefinite"/>
+                      </p:stCondLst>
+                      <p:childTnLst>
+                        <p:par>
+                          <p:cTn id="10" fill="hold">
+                            <p:stCondLst>
+                              <p:cond delay="0"/>
+                            </p:stCondLst>
+                            <p:childTnLst>
+                              <p:par>
+                                <p:cTn id="11" presetID="9" presetClass="entr" presetSubtype="0" fill="hold" grpId="0" nodeType="clickEffect">
+                                  <p:stCondLst>
+                                    <p:cond delay="0"/>
+                                  </p:stCondLst>
+                                  <p:childTnLst>
+                                    <p:set>
+                                      <p:cBhvr>
+                                        <p:cTn id="12" dur="1" fill="hold">
+                                          <p:stCondLst>
+                                            <p:cond delay="0"/>
+                                          </p:stCondLst>
+                                        </p:cTn>
+                                        <p:tgtEl>
+                                          <p:spTgt spid="3"/>
+                                        </p:tgtEl>
+                                        <p:attrNameLst>
+                                          <p:attrName>style.visibility</p:attrName>
+                                        </p:attrNameLst>
+                                      </p:cBhvr>
+                                      <p:to>
+                                        <p:strVal val="visible"/>
+                                      </p:to>
+                                    </p:set>
+                                    <p:animEffect transition="in" filter="dissolve">
+                                      <p:cBhvr>
+                                        <p:cTn id="13" dur="500"/>
+                                        <p:tgtEl>
+                                          <p:spTgt spid="3"/>
+                                        </p:tgtEl>
+                                      </p:cBhvr>
+                                    </p:animEffect>
+                                  </p:childTnLst>
+                                </p:cTn>
+                              </p:par>
+                            </p:childTnLst>
+                          </p:cTn>
+                        </p:par>
+                      </p:childTnLst>
+                    </p:cTn>
+                  </p:par>
+                  <p:par>
+                    <p:cTn id="14" fill="hold">
+                      <p:stCondLst>
+                        <p:cond delay="indefinite"/>
+                      </p:stCondLst>
+                      <p:childTnLst>
+                        <p:par>
+                          <p:cTn id="15" fill="hold">
+                            <p:stCondLst>
+                              <p:cond delay="0"/>
+                            </p:stCondLst>
+                            <p:childTnLst>
+                              <p:par>
+                                <p:cTn id="16" presetID="9" presetClass="entr" presetSubtype="0" fill="hold" grpId="0" nodeType="clickEffect">
+                                  <p:stCondLst>
+                                    <p:cond delay="0"/>
+                                  </p:stCondLst>
+                                  <p:childTnLst>
+                                    <p:set>
+                                      <p:cBhvr>
+                                        <p:cTn id="17" dur="1" fill="hold">
+                                          <p:stCondLst>
+                                            <p:cond delay="0"/>
+                                          </p:stCondLst>
+                                        </p:cTn>
+                                        <p:tgtEl>
+                                          <p:spTgt spid="4"/>
+                                        </p:tgtEl>
+                                        <p:attrNameLst>
+                                          <p:attrName>style.visibility</p:attrName>
+                                        </p:attrNameLst>
+                                      </p:cBhvr>
+                                      <p:to>
+                                        <p:strVal val="visible"/>
+                                      </p:to>
+                                    </p:set>
+                                    <p:animEffect transition="in" filter="dissolve">
+                                      <p:cBhvr>
+                                        <p:cTn id="18" dur="500"/>
+                                        <p:tgtEl>
+                                          <p:spTgt spid="4"/>
+                                        </p:tgtEl>
+                                      </p:cBhvr>
+                                    </p:animEffect>
+                                  </p:childTnLst>
+                                </p:cTn>
+                              </p:par>
+                            </p:childTnLst>
+                          </p:cTn>
+                        </p:par>
+                      </p:childTnLst>
+                    </p:cTn>
+                  </p:par>
                 </p:childTnLst>
               </p:cTn>
               <p:prevCondLst>
@@ -7578,6 +8224,10 @@
         </p:cTn>
       </p:par>
     </p:tnLst>
+    <p:bldLst>
+      <p:bldP spid="3" grpId="0"/>
+      <p:bldP spid="4" grpId="0"/>
+    </p:bldLst>
   </p:timing>
 </p:sld>
 </file>
@@ -7687,8 +8337,8 @@
         </p:nvSpPr>
         <p:spPr>
           <a:xfrm>
-            <a:off x="838200" y="2846388"/>
-            <a:ext cx="7931150" cy="584775"/>
+            <a:off x="838199" y="2846388"/>
+            <a:ext cx="8462963" cy="584775"/>
           </a:xfrm>
           <a:prstGeom prst="rect">
             <a:avLst/>
@@ -7706,10 +8356,16 @@
               <a:buChar char="•"/>
             </a:pPr>
             <a:r>
+              <a:rPr lang="en-US" sz="3200" b="1" u="sng" dirty="0">
+                <a:latin typeface="Garamond" panose="02020404030301010803" pitchFamily="18" charset="0"/>
+              </a:rPr>
+              <a:t>binary</a:t>
+            </a:r>
+            <a:r>
               <a:rPr lang="en-US" sz="3200" dirty="0">
                 <a:latin typeface="Garamond" panose="02020404030301010803" pitchFamily="18" charset="0"/>
               </a:rPr>
-              <a:t>binary classification: positive / NON-positive</a:t>
+              <a:t> classification: positive / NON-positive</a:t>
             </a:r>
           </a:p>
         </p:txBody>
@@ -7728,8 +8384,8 @@
         </p:nvSpPr>
         <p:spPr>
           <a:xfrm>
-            <a:off x="838200" y="4002088"/>
-            <a:ext cx="10293350" cy="584775"/>
+            <a:off x="838199" y="4002088"/>
+            <a:ext cx="10515599" cy="830997"/>
           </a:xfrm>
           <a:prstGeom prst="rect">
             <a:avLst/>
@@ -7750,7 +8406,15 @@
               <a:rPr lang="en-US" sz="3200" dirty="0">
                 <a:latin typeface="Garamond" panose="02020404030301010803" pitchFamily="18" charset="0"/>
               </a:rPr>
-              <a:t>ML classifiers: Naïve Bayes, Random Forest, Gradient Boost</a:t>
+              <a:t>ML classifiers: Naïve Bayes, Random Forest, Gradient Boost*</a:t>
+            </a:r>
+          </a:p>
+          <a:p>
+            <a:r>
+              <a:rPr lang="en-US" sz="1600" dirty="0">
+                <a:latin typeface="Garamond" panose="02020404030301010803" pitchFamily="18" charset="0"/>
+              </a:rPr>
+              <a:t>          * final model</a:t>
             </a:r>
           </a:p>
         </p:txBody>
@@ -7791,7 +8455,13 @@
               <a:rPr lang="en-US" sz="3200" dirty="0">
                 <a:latin typeface="Garamond" panose="02020404030301010803" pitchFamily="18" charset="0"/>
               </a:rPr>
-              <a:t>metric: simple accuracy</a:t>
+              <a:t>metric: </a:t>
+            </a:r>
+            <a:r>
+              <a:rPr lang="en-US" sz="3200" b="1" u="sng" dirty="0">
+                <a:latin typeface="Garamond" panose="02020404030301010803" pitchFamily="18" charset="0"/>
+              </a:rPr>
+              <a:t>accuracy</a:t>
             </a:r>
           </a:p>
         </p:txBody>
@@ -7983,6 +8653,49 @@
                                   </p:childTnLst>
                                 </p:cTn>
                               </p:par>
+                              <p:par>
+                                <p:cTn id="18" presetID="9" presetClass="entr" presetSubtype="0" fill="hold" nodeType="withEffect">
+                                  <p:stCondLst>
+                                    <p:cond delay="0"/>
+                                  </p:stCondLst>
+                                  <p:childTnLst>
+                                    <p:set>
+                                      <p:cBhvr>
+                                        <p:cTn id="19" dur="1" fill="hold">
+                                          <p:stCondLst>
+                                            <p:cond delay="0"/>
+                                          </p:stCondLst>
+                                        </p:cTn>
+                                        <p:tgtEl>
+                                          <p:spTgt spid="10">
+                                            <p:txEl>
+                                              <p:pRg st="1" end="1"/>
+                                            </p:txEl>
+                                          </p:spTgt>
+                                        </p:tgtEl>
+                                        <p:attrNameLst>
+                                          <p:attrName>style.visibility</p:attrName>
+                                        </p:attrNameLst>
+                                      </p:cBhvr>
+                                      <p:to>
+                                        <p:strVal val="visible"/>
+                                      </p:to>
+                                    </p:set>
+                                    <p:animEffect transition="in" filter="dissolve">
+                                      <p:cBhvr>
+                                        <p:cTn id="20" dur="500"/>
+                                        <p:tgtEl>
+                                          <p:spTgt spid="10">
+                                            <p:txEl>
+                                              <p:pRg st="1" end="1"/>
+                                            </p:txEl>
+                                          </p:spTgt>
+                                        </p:tgtEl>
+                                      </p:cBhvr>
+                                    </p:animEffect>
+                                  </p:childTnLst>
+                                </p:cTn>
+                              </p:par>
                             </p:childTnLst>
                           </p:cTn>
                         </p:par>
@@ -7990,26 +8703,26 @@
                     </p:cTn>
                   </p:par>
                   <p:par>
-                    <p:cTn id="18" fill="hold">
+                    <p:cTn id="21" fill="hold">
                       <p:stCondLst>
                         <p:cond delay="indefinite"/>
                       </p:stCondLst>
                       <p:childTnLst>
                         <p:par>
-                          <p:cTn id="19" fill="hold">
+                          <p:cTn id="22" fill="hold">
                             <p:stCondLst>
                               <p:cond delay="0"/>
                             </p:stCondLst>
                             <p:childTnLst>
                               <p:par>
-                                <p:cTn id="20" presetID="9" presetClass="entr" presetSubtype="0" fill="hold" nodeType="clickEffect">
+                                <p:cTn id="23" presetID="9" presetClass="entr" presetSubtype="0" fill="hold" nodeType="clickEffect">
                                   <p:stCondLst>
                                     <p:cond delay="0"/>
                                   </p:stCondLst>
                                   <p:childTnLst>
                                     <p:set>
                                       <p:cBhvr>
-                                        <p:cTn id="21" dur="1" fill="hold">
+                                        <p:cTn id="24" dur="1" fill="hold">
                                           <p:stCondLst>
                                             <p:cond delay="0"/>
                                           </p:stCondLst>
@@ -8031,7 +8744,7 @@
                                     </p:set>
                                     <p:animEffect transition="in" filter="dissolve">
                                       <p:cBhvr>
-                                        <p:cTn id="22" dur="500"/>
+                                        <p:cTn id="25" dur="500"/>
                                         <p:tgtEl>
                                           <p:spTgt spid="11">
                                             <p:txEl>

</xml_diff>